<commit_message>
Check and remove all political and personal implications from the test cases #34  - README.md    - Translate the description in English.  - images/DOVE.pptx  - images/image000.png  - images/image001.png  - images/image002.png  - images/image003.png  - images/logo.png    - Change the logo and image colors.  - programs/dove/src/model.rs    - Add the comment to the code.
</commit_message>
<xml_diff>
--- a/images/DOVE.pptx
+++ b/images/DOVE.pptx
@@ -5,7 +5,7 @@
     <p:sldMasterId id="2147483648" r:id="rId1"/>
   </p:sldMasterIdLst>
   <p:sldIdLst>
-    <p:sldId id="260" r:id="rId2"/>
+    <p:sldId id="267" r:id="rId2"/>
     <p:sldId id="262" r:id="rId3"/>
     <p:sldId id="263" r:id="rId4"/>
     <p:sldId id="264" r:id="rId5"/>
@@ -276,7 +276,7 @@
           <a:p>
             <a:fld id="{02BD01DE-522C-426B-89E7-00E0408C2CFD}" type="datetimeFigureOut">
               <a:rPr kumimoji="1" lang="ja-JP" altLang="en-US" smtClean="0"/>
-              <a:t>2023/4/10</a:t>
+              <a:t>2023/6/30</a:t>
             </a:fld>
             <a:endParaRPr kumimoji="1" lang="ja-JP" altLang="en-US"/>
           </a:p>
@@ -389,7 +389,7 @@
           <a:p>
             <a:fld id="{02BD01DE-522C-426B-89E7-00E0408C2CFD}" type="datetimeFigureOut">
               <a:rPr kumimoji="1" lang="ja-JP" altLang="en-US" smtClean="0"/>
-              <a:t>2023/4/10</a:t>
+              <a:t>2023/6/30</a:t>
             </a:fld>
             <a:endParaRPr kumimoji="1" lang="ja-JP" altLang="en-US"/>
           </a:p>
@@ -648,7 +648,7 @@
           <a:p>
             <a:fld id="{02BD01DE-522C-426B-89E7-00E0408C2CFD}" type="datetimeFigureOut">
               <a:rPr kumimoji="1" lang="ja-JP" altLang="en-US" smtClean="0"/>
-              <a:t>2023/4/10</a:t>
+              <a:t>2023/6/30</a:t>
             </a:fld>
             <a:endParaRPr kumimoji="1" lang="ja-JP" altLang="en-US"/>
           </a:p>
@@ -1102,11 +1102,17 @@
           <a:p>
             <a:r>
               <a:rPr kumimoji="1" lang="en-US" altLang="ja-JP" sz="30000" dirty="0">
+                <a:solidFill>
+                  <a:srgbClr val="1D9BF0"/>
+                </a:solidFill>
                 <a:latin typeface="Bauhaus 93" panose="04030905020B02020C02" pitchFamily="82" charset="0"/>
               </a:rPr>
               <a:t>D   VE</a:t>
             </a:r>
             <a:endParaRPr kumimoji="1" lang="ja-JP" altLang="en-US" sz="30000" dirty="0">
+              <a:solidFill>
+                <a:srgbClr val="1D9BF0"/>
+              </a:solidFill>
               <a:latin typeface="Bauhaus 93" panose="04030905020B02020C02" pitchFamily="82" charset="0"/>
             </a:endParaRPr>
           </a:p>
@@ -1154,7 +1160,7 @@
     </p:spTree>
     <p:extLst>
       <p:ext uri="{BB962C8B-B14F-4D97-AF65-F5344CB8AC3E}">
-        <p14:creationId xmlns:p14="http://schemas.microsoft.com/office/powerpoint/2010/main" val="3814117887"/>
+        <p14:creationId xmlns:p14="http://schemas.microsoft.com/office/powerpoint/2010/main" val="107348400"/>
       </p:ext>
     </p:extLst>
   </p:cSld>
@@ -1226,7 +1232,7 @@
             </a:solidFill>
             <a:ln w="38100">
               <a:solidFill>
-                <a:schemeClr val="tx1"/>
+                <a:srgbClr val="1D9BF0"/>
               </a:solidFill>
             </a:ln>
           </p:spPr>
@@ -1305,7 +1311,7 @@
                 </a:avLst>
               </a:prstGeom>
               <a:solidFill>
-                <a:srgbClr val="FF0000"/>
+                <a:srgbClr val="F09BF0"/>
               </a:solidFill>
               <a:ln>
                 <a:noFill/>
@@ -1359,7 +1365,7 @@
                 </a:avLst>
               </a:prstGeom>
               <a:solidFill>
-                <a:srgbClr val="FF0000"/>
+                <a:srgbClr val="F09BF0"/>
               </a:solidFill>
               <a:ln>
                 <a:noFill/>
@@ -1413,7 +1419,7 @@
                 </a:avLst>
               </a:prstGeom>
               <a:solidFill>
-                <a:srgbClr val="FF0000"/>
+                <a:srgbClr val="F09BF0"/>
               </a:solidFill>
               <a:ln>
                 <a:noFill/>
@@ -1495,7 +1501,7 @@
                 </a:avLst>
               </a:prstGeom>
               <a:solidFill>
-                <a:srgbClr val="FF0000"/>
+                <a:srgbClr val="F09BF0"/>
               </a:solidFill>
               <a:ln>
                 <a:noFill/>
@@ -1549,7 +1555,7 @@
                 </a:avLst>
               </a:prstGeom>
               <a:solidFill>
-                <a:srgbClr val="FF0000"/>
+                <a:srgbClr val="F09BF0"/>
               </a:solidFill>
               <a:ln>
                 <a:noFill/>
@@ -1603,7 +1609,7 @@
                 </a:avLst>
               </a:prstGeom>
               <a:solidFill>
-                <a:srgbClr val="FF0000"/>
+                <a:srgbClr val="F09BF0"/>
               </a:solidFill>
               <a:ln>
                 <a:noFill/>
@@ -1685,7 +1691,7 @@
                 </a:avLst>
               </a:prstGeom>
               <a:solidFill>
-                <a:srgbClr val="FF0000"/>
+                <a:srgbClr val="F09BF0"/>
               </a:solidFill>
               <a:ln>
                 <a:noFill/>
@@ -1739,7 +1745,7 @@
                 </a:avLst>
               </a:prstGeom>
               <a:solidFill>
-                <a:srgbClr val="FF0000"/>
+                <a:srgbClr val="F09BF0"/>
               </a:solidFill>
               <a:ln>
                 <a:noFill/>
@@ -1793,7 +1799,7 @@
                 </a:avLst>
               </a:prstGeom>
               <a:solidFill>
-                <a:srgbClr val="FF0000"/>
+                <a:srgbClr val="F09BF0"/>
               </a:solidFill>
               <a:ln>
                 <a:noFill/>
@@ -1850,7 +1856,7 @@
             </a:solidFill>
             <a:ln w="38100">
               <a:solidFill>
-                <a:schemeClr val="tx1"/>
+                <a:srgbClr val="1D9BF0"/>
               </a:solidFill>
             </a:ln>
             <a:effectLst>
@@ -1886,7 +1892,7 @@
               <a:r>
                 <a:rPr kumimoji="1" lang="en-US" altLang="ja-JP" sz="4000" dirty="0">
                   <a:solidFill>
-                    <a:schemeClr val="tx1"/>
+                    <a:srgbClr val="757575"/>
                   </a:solidFill>
                   <a:latin typeface="Abadi" panose="020B0604020104020204" pitchFamily="34" charset="0"/>
                 </a:rPr>
@@ -1894,7 +1900,7 @@
               </a:r>
               <a:endParaRPr kumimoji="1" lang="ja-JP" altLang="en-US" sz="4000" dirty="0">
                 <a:solidFill>
-                  <a:schemeClr val="tx1"/>
+                  <a:srgbClr val="757575"/>
                 </a:solidFill>
                 <a:latin typeface="Abadi" panose="020B0604020104020204" pitchFamily="34" charset="0"/>
               </a:endParaRPr>
@@ -1926,7 +1932,7 @@
             </a:solidFill>
             <a:ln w="38100">
               <a:solidFill>
-                <a:schemeClr val="tx1"/>
+                <a:srgbClr val="1D9BF0"/>
               </a:solidFill>
             </a:ln>
             <a:effectLst>
@@ -1962,7 +1968,7 @@
               <a:r>
                 <a:rPr kumimoji="1" lang="en-US" altLang="ja-JP" sz="4000" dirty="0">
                   <a:solidFill>
-                    <a:schemeClr val="tx1"/>
+                    <a:srgbClr val="757575"/>
                   </a:solidFill>
                   <a:latin typeface="Abadi" panose="020B0604020104020204" pitchFamily="34" charset="0"/>
                 </a:rPr>
@@ -1971,7 +1977,7 @@
               <a:r>
                 <a:rPr lang="en-US" altLang="ja-JP" sz="4000" dirty="0">
                   <a:solidFill>
-                    <a:schemeClr val="tx1"/>
+                    <a:srgbClr val="757575"/>
                   </a:solidFill>
                   <a:latin typeface="Abadi" panose="020B0604020104020204" pitchFamily="34" charset="0"/>
                 </a:rPr>
@@ -1982,7 +1988,7 @@
               <a:r>
                 <a:rPr kumimoji="1" lang="en-US" altLang="ja-JP" sz="4000" dirty="0">
                   <a:solidFill>
-                    <a:schemeClr val="tx1"/>
+                    <a:srgbClr val="757575"/>
                   </a:solidFill>
                   <a:latin typeface="Abadi" panose="020B0604020104020204" pitchFamily="34" charset="0"/>
                 </a:rPr>
@@ -1990,7 +1996,7 @@
               </a:r>
               <a:endParaRPr kumimoji="1" lang="ja-JP" altLang="en-US" sz="4000" dirty="0">
                 <a:solidFill>
-                  <a:schemeClr val="tx1"/>
+                  <a:srgbClr val="757575"/>
                 </a:solidFill>
                 <a:latin typeface="Abadi" panose="020B0604020104020204" pitchFamily="34" charset="0"/>
               </a:endParaRPr>
@@ -2022,7 +2028,7 @@
             </a:solidFill>
             <a:ln w="38100">
               <a:solidFill>
-                <a:schemeClr val="tx1"/>
+                <a:srgbClr val="1D9BF0"/>
               </a:solidFill>
             </a:ln>
             <a:effectLst>
@@ -2058,7 +2064,7 @@
               <a:r>
                 <a:rPr kumimoji="1" lang="en-US" altLang="ja-JP" sz="4000" dirty="0">
                   <a:solidFill>
-                    <a:schemeClr val="tx1"/>
+                    <a:srgbClr val="757575"/>
                   </a:solidFill>
                   <a:latin typeface="Abadi" panose="020B0604020104020204" pitchFamily="34" charset="0"/>
                 </a:rPr>
@@ -2066,7 +2072,7 @@
               </a:r>
               <a:endParaRPr kumimoji="1" lang="ja-JP" altLang="en-US" sz="4000" dirty="0">
                 <a:solidFill>
-                  <a:schemeClr val="tx1"/>
+                  <a:srgbClr val="757575"/>
                 </a:solidFill>
                 <a:latin typeface="Abadi" panose="020B0604020104020204" pitchFamily="34" charset="0"/>
               </a:endParaRPr>
@@ -2098,7 +2104,7 @@
             </a:solidFill>
             <a:ln w="38100">
               <a:solidFill>
-                <a:schemeClr val="tx1"/>
+                <a:srgbClr val="1D9BF0"/>
               </a:solidFill>
             </a:ln>
             <a:effectLst>
@@ -2134,7 +2140,7 @@
               <a:r>
                 <a:rPr kumimoji="1" lang="en-US" altLang="ja-JP" sz="4000" dirty="0">
                   <a:solidFill>
-                    <a:schemeClr val="tx1"/>
+                    <a:srgbClr val="757575"/>
                   </a:solidFill>
                   <a:latin typeface="Abadi" panose="020B0604020104020204" pitchFamily="34" charset="0"/>
                 </a:rPr>
@@ -2143,7 +2149,7 @@
               <a:r>
                 <a:rPr lang="en-US" altLang="ja-JP" sz="4000" dirty="0">
                   <a:solidFill>
-                    <a:schemeClr val="tx1"/>
+                    <a:srgbClr val="757575"/>
                   </a:solidFill>
                   <a:latin typeface="Abadi" panose="020B0604020104020204" pitchFamily="34" charset="0"/>
                 </a:rPr>
@@ -2177,7 +2183,7 @@
             </a:solidFill>
             <a:ln w="38100">
               <a:solidFill>
-                <a:schemeClr val="tx1"/>
+                <a:srgbClr val="1D9BF0"/>
               </a:solidFill>
             </a:ln>
             <a:effectLst>
@@ -2213,7 +2219,7 @@
               <a:r>
                 <a:rPr kumimoji="1" lang="en-US" altLang="ja-JP" sz="4000" dirty="0">
                   <a:solidFill>
-                    <a:schemeClr val="tx1"/>
+                    <a:srgbClr val="757575"/>
                   </a:solidFill>
                   <a:latin typeface="Abadi" panose="020B0604020104020204" pitchFamily="34" charset="0"/>
                 </a:rPr>
@@ -2221,7 +2227,7 @@
               </a:r>
               <a:endParaRPr kumimoji="1" lang="ja-JP" altLang="en-US" sz="4000" dirty="0">
                 <a:solidFill>
-                  <a:schemeClr val="tx1"/>
+                  <a:srgbClr val="757575"/>
                 </a:solidFill>
                 <a:latin typeface="Abadi" panose="020B0604020104020204" pitchFamily="34" charset="0"/>
               </a:endParaRPr>
@@ -2253,7 +2259,7 @@
             </a:solidFill>
             <a:ln w="38100">
               <a:solidFill>
-                <a:schemeClr val="tx1"/>
+                <a:srgbClr val="1D9BF0"/>
               </a:solidFill>
             </a:ln>
             <a:effectLst>
@@ -2289,7 +2295,7 @@
               <a:r>
                 <a:rPr kumimoji="1" lang="en-US" altLang="ja-JP" sz="4000" dirty="0">
                   <a:solidFill>
-                    <a:schemeClr val="tx1"/>
+                    <a:srgbClr val="757575"/>
                   </a:solidFill>
                   <a:latin typeface="Abadi" panose="020B0604020104020204" pitchFamily="34" charset="0"/>
                 </a:rPr>
@@ -2297,7 +2303,7 @@
               </a:r>
               <a:endParaRPr kumimoji="1" lang="ja-JP" altLang="en-US" sz="4000" dirty="0">
                 <a:solidFill>
-                  <a:schemeClr val="tx1"/>
+                  <a:srgbClr val="757575"/>
                 </a:solidFill>
                 <a:latin typeface="Abadi" panose="020B0604020104020204" pitchFamily="34" charset="0"/>
               </a:endParaRPr>
@@ -2329,7 +2335,7 @@
             </a:solidFill>
             <a:ln w="38100">
               <a:solidFill>
-                <a:schemeClr val="tx1"/>
+                <a:srgbClr val="1D9BF0"/>
               </a:solidFill>
             </a:ln>
             <a:effectLst>
@@ -2365,7 +2371,7 @@
               <a:r>
                 <a:rPr kumimoji="1" lang="en-US" altLang="ja-JP" sz="4000" dirty="0">
                   <a:solidFill>
-                    <a:schemeClr val="tx1"/>
+                    <a:srgbClr val="757575"/>
                   </a:solidFill>
                   <a:latin typeface="Abadi" panose="020B0604020104020204" pitchFamily="34" charset="0"/>
                 </a:rPr>
@@ -2373,7 +2379,7 @@
               </a:r>
               <a:endParaRPr kumimoji="1" lang="ja-JP" altLang="en-US" sz="4000" dirty="0">
                 <a:solidFill>
-                  <a:schemeClr val="tx1"/>
+                  <a:srgbClr val="757575"/>
                 </a:solidFill>
                 <a:latin typeface="Abadi" panose="020B0604020104020204" pitchFamily="34" charset="0"/>
               </a:endParaRPr>
@@ -2405,7 +2411,7 @@
             </a:prstGeom>
             <a:ln w="38100">
               <a:solidFill>
-                <a:srgbClr val="FF0000"/>
+                <a:srgbClr val="F09BF0"/>
               </a:solidFill>
               <a:tailEnd type="arrow"/>
             </a:ln>
@@ -2457,7 +2463,7 @@
             </a:prstGeom>
             <a:ln w="38100">
               <a:solidFill>
-                <a:srgbClr val="FF0000"/>
+                <a:srgbClr val="F09BF0"/>
               </a:solidFill>
               <a:tailEnd type="arrow"/>
             </a:ln>
@@ -2509,7 +2515,7 @@
             </a:prstGeom>
             <a:ln w="38100">
               <a:solidFill>
-                <a:srgbClr val="FF0000"/>
+                <a:srgbClr val="F09BF0"/>
               </a:solidFill>
               <a:tailEnd type="arrow"/>
             </a:ln>
@@ -2601,7 +2607,7 @@
             </a:prstGeom>
             <a:ln w="38100">
               <a:solidFill>
-                <a:schemeClr val="tx1"/>
+                <a:srgbClr val="1D9BF0"/>
               </a:solidFill>
               <a:tailEnd type="arrow"/>
             </a:ln>
@@ -2654,7 +2660,7 @@
             </a:prstGeom>
             <a:ln w="38100">
               <a:solidFill>
-                <a:schemeClr val="tx1"/>
+                <a:srgbClr val="1D9BF0"/>
               </a:solidFill>
               <a:tailEnd type="arrow"/>
             </a:ln>
@@ -2712,7 +2718,7 @@
               <a:r>
                 <a:rPr lang="en-US" altLang="ja-JP" sz="2400" dirty="0">
                   <a:solidFill>
-                    <a:schemeClr val="tx1"/>
+                    <a:srgbClr val="757575"/>
                   </a:solidFill>
                   <a:latin typeface="Abadi" panose="020B0604020104020204" pitchFamily="34" charset="0"/>
                 </a:rPr>
@@ -2721,7 +2727,7 @@
               <a:r>
                 <a:rPr lang="ja-JP" altLang="en-US" sz="2400" dirty="0">
                   <a:solidFill>
-                    <a:schemeClr val="tx1"/>
+                    <a:srgbClr val="757575"/>
                   </a:solidFill>
                   <a:latin typeface="Abadi" panose="020B0604020104020204" pitchFamily="34" charset="0"/>
                 </a:rPr>
@@ -2730,13 +2736,16 @@
               <a:r>
                 <a:rPr lang="en-US" altLang="ja-JP" sz="2400" dirty="0">
                   <a:solidFill>
-                    <a:schemeClr val="tx1"/>
+                    <a:srgbClr val="757575"/>
                   </a:solidFill>
                   <a:latin typeface="Abadi" panose="020B0604020104020204" pitchFamily="34" charset="0"/>
                 </a:rPr>
                 <a:t>created project to defend Country ABC from the attack from Country XYZ</a:t>
               </a:r>
               <a:endParaRPr lang="ja-JP" altLang="en-US" sz="2400" dirty="0">
+                <a:solidFill>
+                  <a:srgbClr val="757575"/>
+                </a:solidFill>
                 <a:latin typeface="Abadi" panose="020B0604020104020204" pitchFamily="34" charset="0"/>
               </a:endParaRPr>
             </a:p>
@@ -2773,13 +2782,16 @@
               <a:r>
                 <a:rPr lang="en-US" altLang="ja-JP" sz="2400" dirty="0">
                   <a:solidFill>
-                    <a:schemeClr val="tx1"/>
+                    <a:srgbClr val="757575"/>
                   </a:solidFill>
                   <a:latin typeface="Abadi" panose="020B0604020104020204" pitchFamily="34" charset="0"/>
                 </a:rPr>
                 <a:t>Suspicious “incident” activities</a:t>
               </a:r>
               <a:endParaRPr lang="ja-JP" altLang="en-US" sz="2400" dirty="0">
+                <a:solidFill>
+                  <a:srgbClr val="757575"/>
+                </a:solidFill>
                 <a:latin typeface="Abadi" panose="020B0604020104020204" pitchFamily="34" charset="0"/>
               </a:endParaRPr>
             </a:p>
@@ -2815,27 +2827,30 @@
             <a:p>
               <a:r>
                 <a:rPr lang="en-US" altLang="ja-JP" sz="2400" dirty="0">
+                  <a:solidFill>
+                    <a:srgbClr val="757575"/>
+                  </a:solidFill>
                   <a:latin typeface="Abadi" panose="020B0604020104020204" pitchFamily="34" charset="0"/>
                 </a:rPr>
                 <a:t>Create and</a:t>
               </a:r>
               <a:br>
                 <a:rPr lang="en-US" altLang="ja-JP" sz="2400" dirty="0">
+                  <a:solidFill>
+                    <a:srgbClr val="757575"/>
+                  </a:solidFill>
                   <a:latin typeface="Abadi" panose="020B0604020104020204" pitchFamily="34" charset="0"/>
                 </a:rPr>
               </a:br>
               <a:r>
                 <a:rPr lang="en-US" altLang="ja-JP" sz="2400" dirty="0">
+                  <a:solidFill>
+                    <a:srgbClr val="757575"/>
+                  </a:solidFill>
                   <a:latin typeface="Abadi" panose="020B0604020104020204" pitchFamily="34" charset="0"/>
                 </a:rPr>
                 <a:t>manage Project</a:t>
               </a:r>
-              <a:endParaRPr lang="en-US" altLang="ja-JP" sz="2400" dirty="0">
-                <a:solidFill>
-                  <a:schemeClr val="tx1"/>
-                </a:solidFill>
-                <a:latin typeface="Abadi" panose="020B0604020104020204" pitchFamily="34" charset="0"/>
-              </a:endParaRPr>
             </a:p>
           </p:txBody>
         </p:sp>
@@ -2989,7 +3004,7 @@
               <a:r>
                 <a:rPr lang="en-US" altLang="ja-JP" sz="2400" dirty="0">
                   <a:solidFill>
-                    <a:schemeClr val="tx1"/>
+                    <a:srgbClr val="757575"/>
                   </a:solidFill>
                   <a:latin typeface="Abadi" panose="020B0604020104020204" pitchFamily="34" charset="0"/>
                 </a:rPr>
@@ -2998,7 +3013,7 @@
               <a:br>
                 <a:rPr lang="en-US" altLang="ja-JP" sz="2400" dirty="0">
                   <a:solidFill>
-                    <a:schemeClr val="tx1"/>
+                    <a:srgbClr val="757575"/>
                   </a:solidFill>
                   <a:latin typeface="Abadi" panose="020B0604020104020204" pitchFamily="34" charset="0"/>
                 </a:rPr>
@@ -3006,7 +3021,7 @@
               <a:r>
                 <a:rPr lang="en-US" altLang="ja-JP" sz="2400" dirty="0">
                   <a:solidFill>
-                    <a:schemeClr val="tx1"/>
+                    <a:srgbClr val="757575"/>
                   </a:solidFill>
                   <a:latin typeface="Abadi" panose="020B0604020104020204" pitchFamily="34" charset="0"/>
                 </a:rPr>
@@ -3091,7 +3106,7 @@
             </a:solidFill>
             <a:ln w="38100">
               <a:solidFill>
-                <a:schemeClr val="tx1"/>
+                <a:srgbClr val="1D9BF0"/>
               </a:solidFill>
             </a:ln>
           </p:spPr>
@@ -3190,7 +3205,7 @@
                   </a:avLst>
                 </a:prstGeom>
                 <a:solidFill>
-                  <a:srgbClr val="FF0000"/>
+                  <a:srgbClr val="F09BF0"/>
                 </a:solidFill>
                 <a:ln>
                   <a:noFill/>
@@ -3244,7 +3259,7 @@
                   </a:avLst>
                 </a:prstGeom>
                 <a:solidFill>
-                  <a:srgbClr val="FF0000"/>
+                  <a:srgbClr val="F09BF0"/>
                 </a:solidFill>
                 <a:ln>
                   <a:noFill/>
@@ -3298,7 +3313,7 @@
                   </a:avLst>
                 </a:prstGeom>
                 <a:solidFill>
-                  <a:srgbClr val="FF0000"/>
+                  <a:srgbClr val="F09BF0"/>
                 </a:solidFill>
                 <a:ln>
                   <a:noFill/>
@@ -3373,7 +3388,7 @@
                   </a:avLst>
                 </a:prstGeom>
                 <a:solidFill>
-                  <a:srgbClr val="FF0000"/>
+                  <a:srgbClr val="F09BF0"/>
                 </a:solidFill>
                 <a:ln>
                   <a:noFill/>
@@ -3427,7 +3442,7 @@
                   </a:avLst>
                 </a:prstGeom>
                 <a:solidFill>
-                  <a:srgbClr val="FF0000"/>
+                  <a:srgbClr val="F09BF0"/>
                 </a:solidFill>
                 <a:ln>
                   <a:noFill/>
@@ -3481,7 +3496,7 @@
                   </a:avLst>
                 </a:prstGeom>
                 <a:solidFill>
-                  <a:srgbClr val="FF0000"/>
+                  <a:srgbClr val="F09BF0"/>
                 </a:solidFill>
                 <a:ln>
                   <a:noFill/>
@@ -3556,7 +3571,7 @@
                   </a:avLst>
                 </a:prstGeom>
                 <a:solidFill>
-                  <a:srgbClr val="FF0000"/>
+                  <a:srgbClr val="F09BF0"/>
                 </a:solidFill>
                 <a:ln>
                   <a:noFill/>
@@ -3610,7 +3625,7 @@
                   </a:avLst>
                 </a:prstGeom>
                 <a:solidFill>
-                  <a:srgbClr val="FF0000"/>
+                  <a:srgbClr val="F09BF0"/>
                 </a:solidFill>
                 <a:ln>
                   <a:noFill/>
@@ -3664,7 +3679,7 @@
                   </a:avLst>
                 </a:prstGeom>
                 <a:solidFill>
-                  <a:srgbClr val="FF0000"/>
+                  <a:srgbClr val="F09BF0"/>
                 </a:solidFill>
                 <a:ln>
                   <a:noFill/>
@@ -3722,7 +3737,7 @@
             </a:solidFill>
             <a:ln w="38100">
               <a:solidFill>
-                <a:schemeClr val="tx1"/>
+                <a:srgbClr val="1D9BF0"/>
               </a:solidFill>
             </a:ln>
             <a:effectLst>
@@ -3758,7 +3773,7 @@
               <a:r>
                 <a:rPr kumimoji="1" lang="en-US" altLang="ja-JP" sz="4000" dirty="0">
                   <a:solidFill>
-                    <a:schemeClr val="tx1"/>
+                    <a:srgbClr val="757575"/>
                   </a:solidFill>
                   <a:latin typeface="Abadi" panose="020B0604020104020204" pitchFamily="34" charset="0"/>
                 </a:rPr>
@@ -3767,7 +3782,7 @@
               <a:r>
                 <a:rPr lang="en-US" altLang="ja-JP" sz="4000" dirty="0">
                   <a:solidFill>
-                    <a:schemeClr val="tx1"/>
+                    <a:srgbClr val="757575"/>
                   </a:solidFill>
                   <a:latin typeface="Abadi" panose="020B0604020104020204" pitchFamily="34" charset="0"/>
                 </a:rPr>
@@ -3778,7 +3793,7 @@
               <a:r>
                 <a:rPr kumimoji="1" lang="en-US" altLang="ja-JP" sz="4000" dirty="0">
                   <a:solidFill>
-                    <a:schemeClr val="tx1"/>
+                    <a:srgbClr val="757575"/>
                   </a:solidFill>
                   <a:latin typeface="Abadi" panose="020B0604020104020204" pitchFamily="34" charset="0"/>
                 </a:rPr>
@@ -3786,7 +3801,7 @@
               </a:r>
               <a:endParaRPr kumimoji="1" lang="ja-JP" altLang="en-US" sz="4000" dirty="0">
                 <a:solidFill>
-                  <a:schemeClr val="tx1"/>
+                  <a:srgbClr val="757575"/>
                 </a:solidFill>
                 <a:latin typeface="Abadi" panose="020B0604020104020204" pitchFamily="34" charset="0"/>
               </a:endParaRPr>
@@ -3818,7 +3833,7 @@
             </a:solidFill>
             <a:ln w="38100">
               <a:solidFill>
-                <a:schemeClr val="tx1"/>
+                <a:srgbClr val="1D9BF0"/>
               </a:solidFill>
             </a:ln>
             <a:effectLst>
@@ -3854,7 +3869,7 @@
               <a:r>
                 <a:rPr kumimoji="1" lang="en-US" altLang="ja-JP" sz="4000" dirty="0">
                   <a:solidFill>
-                    <a:schemeClr val="tx1"/>
+                    <a:srgbClr val="757575"/>
                   </a:solidFill>
                   <a:latin typeface="Abadi" panose="020B0604020104020204" pitchFamily="34" charset="0"/>
                 </a:rPr>
@@ -3862,7 +3877,7 @@
               </a:r>
               <a:endParaRPr kumimoji="1" lang="ja-JP" altLang="en-US" sz="4000" dirty="0">
                 <a:solidFill>
-                  <a:schemeClr val="tx1"/>
+                  <a:srgbClr val="757575"/>
                 </a:solidFill>
                 <a:latin typeface="Abadi" panose="020B0604020104020204" pitchFamily="34" charset="0"/>
               </a:endParaRPr>
@@ -3894,7 +3909,7 @@
             </a:solidFill>
             <a:ln w="38100">
               <a:solidFill>
-                <a:schemeClr val="tx1"/>
+                <a:srgbClr val="1D9BF0"/>
               </a:solidFill>
             </a:ln>
             <a:effectLst>
@@ -3930,7 +3945,7 @@
               <a:r>
                 <a:rPr kumimoji="1" lang="en-US" altLang="ja-JP" sz="4000" dirty="0">
                   <a:solidFill>
-                    <a:schemeClr val="tx1"/>
+                    <a:srgbClr val="757575"/>
                   </a:solidFill>
                   <a:latin typeface="Abadi" panose="020B0604020104020204" pitchFamily="34" charset="0"/>
                 </a:rPr>
@@ -3938,7 +3953,7 @@
               </a:r>
               <a:endParaRPr kumimoji="1" lang="ja-JP" altLang="en-US" sz="4000" dirty="0">
                 <a:solidFill>
-                  <a:schemeClr val="tx1"/>
+                  <a:srgbClr val="757575"/>
                 </a:solidFill>
                 <a:latin typeface="Abadi" panose="020B0604020104020204" pitchFamily="34" charset="0"/>
               </a:endParaRPr>
@@ -3970,7 +3985,7 @@
             </a:solidFill>
             <a:ln w="38100">
               <a:solidFill>
-                <a:schemeClr val="tx1"/>
+                <a:srgbClr val="1D9BF0"/>
               </a:solidFill>
             </a:ln>
             <a:effectLst>
@@ -4006,7 +4021,7 @@
               <a:r>
                 <a:rPr kumimoji="1" lang="en-US" altLang="ja-JP" sz="4000" dirty="0">
                   <a:solidFill>
-                    <a:schemeClr val="tx1"/>
+                    <a:srgbClr val="757575"/>
                   </a:solidFill>
                   <a:latin typeface="Abadi" panose="020B0604020104020204" pitchFamily="34" charset="0"/>
                 </a:rPr>
@@ -4015,7 +4030,7 @@
               <a:r>
                 <a:rPr lang="en-US" altLang="ja-JP" sz="4000" dirty="0">
                   <a:solidFill>
-                    <a:schemeClr val="tx1"/>
+                    <a:srgbClr val="757575"/>
                   </a:solidFill>
                   <a:latin typeface="Abadi" panose="020B0604020104020204" pitchFamily="34" charset="0"/>
                 </a:rPr>
@@ -4049,7 +4064,7 @@
             </a:solidFill>
             <a:ln w="38100">
               <a:solidFill>
-                <a:schemeClr val="tx1"/>
+                <a:srgbClr val="1D9BF0"/>
               </a:solidFill>
             </a:ln>
             <a:effectLst>
@@ -4085,7 +4100,7 @@
               <a:r>
                 <a:rPr kumimoji="1" lang="en-US" altLang="ja-JP" sz="4000" dirty="0">
                   <a:solidFill>
-                    <a:schemeClr val="tx1"/>
+                    <a:srgbClr val="757575"/>
                   </a:solidFill>
                   <a:latin typeface="Abadi" panose="020B0604020104020204" pitchFamily="34" charset="0"/>
                 </a:rPr>
@@ -4093,7 +4108,7 @@
               </a:r>
               <a:endParaRPr kumimoji="1" lang="ja-JP" altLang="en-US" sz="4000" dirty="0">
                 <a:solidFill>
-                  <a:schemeClr val="tx1"/>
+                  <a:srgbClr val="757575"/>
                 </a:solidFill>
                 <a:latin typeface="Abadi" panose="020B0604020104020204" pitchFamily="34" charset="0"/>
               </a:endParaRPr>
@@ -4125,7 +4140,7 @@
             </a:solidFill>
             <a:ln w="38100">
               <a:solidFill>
-                <a:schemeClr val="tx1"/>
+                <a:srgbClr val="1D9BF0"/>
               </a:solidFill>
             </a:ln>
             <a:effectLst>
@@ -4161,7 +4176,7 @@
               <a:r>
                 <a:rPr kumimoji="1" lang="en-US" altLang="ja-JP" sz="4000" dirty="0">
                   <a:solidFill>
-                    <a:schemeClr val="tx1"/>
+                    <a:srgbClr val="757575"/>
                   </a:solidFill>
                   <a:latin typeface="Abadi" panose="020B0604020104020204" pitchFamily="34" charset="0"/>
                 </a:rPr>
@@ -4169,7 +4184,7 @@
               </a:r>
               <a:endParaRPr kumimoji="1" lang="ja-JP" altLang="en-US" sz="4000" dirty="0">
                 <a:solidFill>
-                  <a:schemeClr val="tx1"/>
+                  <a:srgbClr val="757575"/>
                 </a:solidFill>
                 <a:latin typeface="Abadi" panose="020B0604020104020204" pitchFamily="34" charset="0"/>
               </a:endParaRPr>
@@ -4201,7 +4216,7 @@
             </a:solidFill>
             <a:ln w="38100">
               <a:solidFill>
-                <a:schemeClr val="tx1"/>
+                <a:srgbClr val="1D9BF0"/>
               </a:solidFill>
             </a:ln>
             <a:effectLst>
@@ -4237,7 +4252,7 @@
               <a:r>
                 <a:rPr kumimoji="1" lang="en-US" altLang="ja-JP" sz="4000" dirty="0">
                   <a:solidFill>
-                    <a:schemeClr val="tx1"/>
+                    <a:srgbClr val="757575"/>
                   </a:solidFill>
                   <a:latin typeface="Abadi" panose="020B0604020104020204" pitchFamily="34" charset="0"/>
                 </a:rPr>
@@ -4245,7 +4260,7 @@
               </a:r>
               <a:endParaRPr kumimoji="1" lang="ja-JP" altLang="en-US" sz="4000" dirty="0">
                 <a:solidFill>
-                  <a:schemeClr val="tx1"/>
+                  <a:srgbClr val="757575"/>
                 </a:solidFill>
                 <a:latin typeface="Abadi" panose="020B0604020104020204" pitchFamily="34" charset="0"/>
               </a:endParaRPr>
@@ -4276,7 +4291,7 @@
             </a:prstGeom>
             <a:ln w="38100">
               <a:solidFill>
-                <a:schemeClr val="tx1"/>
+                <a:srgbClr val="1D9BF0"/>
               </a:solidFill>
               <a:tailEnd type="arrow"/>
             </a:ln>
@@ -4328,7 +4343,7 @@
             </a:prstGeom>
             <a:ln w="38100">
               <a:solidFill>
-                <a:schemeClr val="tx1"/>
+                <a:srgbClr val="1D9BF0"/>
               </a:solidFill>
               <a:tailEnd type="arrow"/>
             </a:ln>
@@ -4386,13 +4401,16 @@
               <a:r>
                 <a:rPr lang="en-US" altLang="ja-JP" sz="2400" dirty="0">
                   <a:solidFill>
-                    <a:schemeClr val="tx1"/>
+                    <a:srgbClr val="757575"/>
                   </a:solidFill>
                   <a:latin typeface="Abadi" panose="020B0604020104020204" pitchFamily="34" charset="0"/>
                 </a:rPr>
                 <a:t>If the pooled amount is visible to Country XYZ and enough huge, it can be expected to suppress the incident happen.</a:t>
               </a:r>
               <a:endParaRPr lang="ja-JP" altLang="en-US" sz="2400" dirty="0">
+                <a:solidFill>
+                  <a:srgbClr val="757575"/>
+                </a:solidFill>
                 <a:latin typeface="Abadi" panose="020B0604020104020204" pitchFamily="34" charset="0"/>
               </a:endParaRPr>
             </a:p>
@@ -4450,84 +4468,6 @@
             </a:p>
           </p:txBody>
         </p:sp>
-        <p:pic>
-          <p:nvPicPr>
-            <p:cNvPr id="29" name="Picture 28">
-              <a:extLst>
-                <a:ext uri="{FF2B5EF4-FFF2-40B4-BE49-F238E27FC236}">
-                  <a16:creationId xmlns:a16="http://schemas.microsoft.com/office/drawing/2014/main" id="{0BDC6565-6B96-FADE-E0ED-EB2387CB25B4}"/>
-                </a:ext>
-              </a:extLst>
-            </p:cNvPr>
-            <p:cNvPicPr>
-              <a:picLocks noChangeAspect="1"/>
-            </p:cNvPicPr>
-            <p:nvPr/>
-          </p:nvPicPr>
-          <p:blipFill>
-            <a:blip r:embed="rId2"/>
-            <a:stretch>
-              <a:fillRect/>
-            </a:stretch>
-          </p:blipFill>
-          <p:spPr>
-            <a:xfrm>
-              <a:off x="4624302" y="3787534"/>
-              <a:ext cx="876422" cy="876422"/>
-            </a:xfrm>
-            <a:prstGeom prst="rect">
-              <a:avLst/>
-            </a:prstGeom>
-            <a:noFill/>
-            <a:effectLst>
-              <a:outerShdw blurRad="50800" dist="38100" dir="2700000" algn="tl" rotWithShape="0">
-                <a:prstClr val="black">
-                  <a:alpha val="40000"/>
-                </a:prstClr>
-              </a:outerShdw>
-            </a:effectLst>
-          </p:spPr>
-        </p:pic>
-        <p:pic>
-          <p:nvPicPr>
-            <p:cNvPr id="31" name="Picture 30">
-              <a:extLst>
-                <a:ext uri="{FF2B5EF4-FFF2-40B4-BE49-F238E27FC236}">
-                  <a16:creationId xmlns:a16="http://schemas.microsoft.com/office/drawing/2014/main" id="{85276DD5-FDD8-5611-9287-5E077140874D}"/>
-                </a:ext>
-              </a:extLst>
-            </p:cNvPr>
-            <p:cNvPicPr>
-              <a:picLocks noChangeAspect="1"/>
-            </p:cNvPicPr>
-            <p:nvPr/>
-          </p:nvPicPr>
-          <p:blipFill>
-            <a:blip r:embed="rId3"/>
-            <a:stretch>
-              <a:fillRect/>
-            </a:stretch>
-          </p:blipFill>
-          <p:spPr>
-            <a:xfrm>
-              <a:off x="4420203" y="3909684"/>
-              <a:ext cx="543001" cy="552527"/>
-            </a:xfrm>
-            <a:prstGeom prst="rect">
-              <a:avLst/>
-            </a:prstGeom>
-            <a:solidFill>
-              <a:schemeClr val="bg1"/>
-            </a:solidFill>
-            <a:effectLst>
-              <a:outerShdw blurRad="50800" dist="38100" dir="2700000" algn="tl" rotWithShape="0">
-                <a:prstClr val="black">
-                  <a:alpha val="40000"/>
-                </a:prstClr>
-              </a:outerShdw>
-            </a:effectLst>
-          </p:spPr>
-        </p:pic>
         <p:cxnSp>
           <p:nvCxnSpPr>
             <p:cNvPr id="35" name="Connector: Curved 34">
@@ -4556,7 +4496,7 @@
             </a:prstGeom>
             <a:ln w="38100">
               <a:solidFill>
-                <a:srgbClr val="FF0000"/>
+                <a:srgbClr val="1D9BF0"/>
               </a:solidFill>
               <a:tailEnd type="arrow"/>
             </a:ln>
@@ -4607,7 +4547,7 @@
             </a:prstGeom>
             <a:ln w="38100">
               <a:solidFill>
-                <a:schemeClr val="tx1"/>
+                <a:srgbClr val="1D9BF0"/>
               </a:solidFill>
               <a:tailEnd type="arrow"/>
             </a:ln>
@@ -4665,13 +4605,16 @@
               <a:r>
                 <a:rPr lang="en-US" altLang="ja-JP" sz="2400" dirty="0">
                   <a:solidFill>
-                    <a:schemeClr val="tx1"/>
+                    <a:srgbClr val="757575"/>
                   </a:solidFill>
                   <a:latin typeface="Abadi" panose="020B0604020104020204" pitchFamily="34" charset="0"/>
                 </a:rPr>
                 <a:t>Once “incident” actually happen</a:t>
               </a:r>
               <a:endParaRPr lang="ja-JP" altLang="en-US" sz="2400" dirty="0">
+                <a:solidFill>
+                  <a:srgbClr val="757575"/>
+                </a:solidFill>
                 <a:latin typeface="Abadi" panose="020B0604020104020204" pitchFamily="34" charset="0"/>
               </a:endParaRPr>
             </a:p>
@@ -4807,18 +4750,12 @@
             <a:p>
               <a:r>
                 <a:rPr lang="en-US" altLang="ja-JP" sz="2400" dirty="0">
-                  <a:latin typeface="Abadi" panose="020B0604020104020204" pitchFamily="34" charset="0"/>
-                </a:rPr>
-                <a:t>As like the opened vault, </a:t>
-              </a:r>
-              <a:r>
-                <a:rPr lang="en-US" altLang="ja-JP" sz="2400" dirty="0">
                   <a:solidFill>
-                    <a:schemeClr val="tx1"/>
+                    <a:srgbClr val="757575"/>
                   </a:solidFill>
                   <a:latin typeface="Abadi" panose="020B0604020104020204" pitchFamily="34" charset="0"/>
                 </a:rPr>
-                <a:t>the NPO/NGO/Government can withdraw the pooled Solana to support the Country ABC</a:t>
+                <a:t>As like the opened vault, the NPO/NGO/Government can withdraw the pooled Solana to support the Country ABC</a:t>
               </a:r>
             </a:p>
           </p:txBody>
@@ -4890,13 +4827,13 @@
             <p:nvPr/>
           </p:nvPicPr>
           <p:blipFill>
-            <a:blip r:embed="rId4">
+            <a:blip r:embed="rId2">
               <a:extLst>
                 <a:ext uri="{28A0092B-C50C-407E-A947-70E740481C1C}">
                   <a14:useLocalDpi xmlns:a14="http://schemas.microsoft.com/office/drawing/2010/main" val="0"/>
                 </a:ext>
                 <a:ext uri="{96DAC541-7B7A-43D3-8B79-37D633B846F1}">
-                  <asvg:svgBlip xmlns:asvg="http://schemas.microsoft.com/office/drawing/2016/SVG/main" r:embed="rId5"/>
+                  <asvg:svgBlip xmlns:asvg="http://schemas.microsoft.com/office/drawing/2016/SVG/main" r:embed="rId3"/>
                 </a:ext>
               </a:extLst>
             </a:blip>
@@ -4945,7 +4882,7 @@
             </a:prstGeom>
             <a:ln w="38100">
               <a:solidFill>
-                <a:schemeClr val="tx1"/>
+                <a:srgbClr val="1D9BF0"/>
               </a:solidFill>
               <a:tailEnd type="arrow"/>
             </a:ln>
@@ -4996,7 +4933,7 @@
             </a:prstGeom>
             <a:ln w="38100">
               <a:solidFill>
-                <a:schemeClr val="tx1"/>
+                <a:srgbClr val="1D9BF0"/>
               </a:solidFill>
               <a:tailEnd type="arrow"/>
             </a:ln>
@@ -5047,7 +4984,7 @@
             </a:prstGeom>
             <a:ln w="38100">
               <a:solidFill>
-                <a:schemeClr val="tx1"/>
+                <a:srgbClr val="1D9BF0"/>
               </a:solidFill>
               <a:tailEnd type="arrow"/>
             </a:ln>
@@ -5075,6 +5012,156 @@
           </p:style>
         </p:cxnSp>
       </p:grpSp>
+      <p:pic>
+        <p:nvPicPr>
+          <p:cNvPr id="21" name="Graphic 20" descr="Safe with solid fill">
+            <a:extLst>
+              <a:ext uri="{FF2B5EF4-FFF2-40B4-BE49-F238E27FC236}">
+                <a16:creationId xmlns:a16="http://schemas.microsoft.com/office/drawing/2014/main" id="{26F684F3-1A5B-75B5-73F0-4C10F3BC6FC2}"/>
+              </a:ext>
+            </a:extLst>
+          </p:cNvPr>
+          <p:cNvPicPr>
+            <a:picLocks noChangeAspect="1"/>
+          </p:cNvPicPr>
+          <p:nvPr/>
+        </p:nvPicPr>
+        <p:blipFill>
+          <a:blip r:embed="rId4">
+            <a:extLst>
+              <a:ext uri="{28A0092B-C50C-407E-A947-70E740481C1C}">
+                <a14:useLocalDpi xmlns:a14="http://schemas.microsoft.com/office/drawing/2010/main" val="0"/>
+              </a:ext>
+              <a:ext uri="{96DAC541-7B7A-43D3-8B79-37D633B846F1}">
+                <asvg:svgBlip xmlns:asvg="http://schemas.microsoft.com/office/drawing/2016/SVG/main" r:embed="rId5"/>
+              </a:ext>
+            </a:extLst>
+          </a:blip>
+          <a:stretch>
+            <a:fillRect/>
+          </a:stretch>
+        </p:blipFill>
+        <p:spPr>
+          <a:xfrm>
+            <a:off x="4619686" y="3718255"/>
+            <a:ext cx="1071315" cy="1071315"/>
+          </a:xfrm>
+          <a:prstGeom prst="rect">
+            <a:avLst/>
+          </a:prstGeom>
+          <a:effectLst>
+            <a:outerShdw blurRad="50800" dist="38100" dir="2700000" algn="tl" rotWithShape="0">
+              <a:prstClr val="black">
+                <a:alpha val="40000"/>
+              </a:prstClr>
+            </a:outerShdw>
+          </a:effectLst>
+        </p:spPr>
+      </p:pic>
+      <p:sp>
+        <p:nvSpPr>
+          <p:cNvPr id="34" name="Rectangle 33">
+            <a:extLst>
+              <a:ext uri="{FF2B5EF4-FFF2-40B4-BE49-F238E27FC236}">
+                <a16:creationId xmlns:a16="http://schemas.microsoft.com/office/drawing/2014/main" id="{65D64238-23CC-0685-55C0-CF10105B54AA}"/>
+              </a:ext>
+            </a:extLst>
+          </p:cNvPr>
+          <p:cNvSpPr/>
+          <p:nvPr/>
+        </p:nvSpPr>
+        <p:spPr>
+          <a:xfrm>
+            <a:off x="4842510" y="3907550"/>
+            <a:ext cx="624840" cy="626349"/>
+          </a:xfrm>
+          <a:prstGeom prst="rect">
+            <a:avLst/>
+          </a:prstGeom>
+          <a:solidFill>
+            <a:schemeClr val="bg1"/>
+          </a:solidFill>
+          <a:ln>
+            <a:noFill/>
+          </a:ln>
+          <a:effectLst>
+            <a:innerShdw blurRad="63500" dist="50800" dir="13500000">
+              <a:prstClr val="black">
+                <a:alpha val="50000"/>
+              </a:prstClr>
+            </a:innerShdw>
+          </a:effectLst>
+        </p:spPr>
+        <p:style>
+          <a:lnRef idx="2">
+            <a:schemeClr val="accent1">
+              <a:shade val="15000"/>
+            </a:schemeClr>
+          </a:lnRef>
+          <a:fillRef idx="1">
+            <a:schemeClr val="accent1"/>
+          </a:fillRef>
+          <a:effectRef idx="0">
+            <a:schemeClr val="accent1"/>
+          </a:effectRef>
+          <a:fontRef idx="minor">
+            <a:schemeClr val="lt1"/>
+          </a:fontRef>
+        </p:style>
+        <p:txBody>
+          <a:bodyPr rtlCol="0" anchor="ctr"/>
+          <a:lstStyle/>
+          <a:p>
+            <a:pPr algn="ctr"/>
+            <a:endParaRPr kumimoji="1" lang="ja-JP" altLang="en-US"/>
+          </a:p>
+        </p:txBody>
+      </p:sp>
+      <p:pic>
+        <p:nvPicPr>
+          <p:cNvPr id="19" name="Graphic 18" descr="Safe with solid fill">
+            <a:extLst>
+              <a:ext uri="{FF2B5EF4-FFF2-40B4-BE49-F238E27FC236}">
+                <a16:creationId xmlns:a16="http://schemas.microsoft.com/office/drawing/2014/main" id="{B70656D3-A9B2-B5FE-FF6A-2E4A21D648F5}"/>
+              </a:ext>
+            </a:extLst>
+          </p:cNvPr>
+          <p:cNvPicPr>
+            <a:picLocks noChangeAspect="1"/>
+          </p:cNvPicPr>
+          <p:nvPr/>
+        </p:nvPicPr>
+        <p:blipFill rotWithShape="1">
+          <a:blip r:embed="rId4">
+            <a:extLst>
+              <a:ext uri="{28A0092B-C50C-407E-A947-70E740481C1C}">
+                <a14:useLocalDpi xmlns:a14="http://schemas.microsoft.com/office/drawing/2010/main" val="0"/>
+              </a:ext>
+              <a:ext uri="{96DAC541-7B7A-43D3-8B79-37D633B846F1}">
+                <asvg:svgBlip xmlns:asvg="http://schemas.microsoft.com/office/drawing/2016/SVG/main" r:embed="rId5"/>
+              </a:ext>
+            </a:extLst>
+          </a:blip>
+          <a:srcRect l="22636" t="19075" r="22951" b="25336"/>
+          <a:stretch/>
+        </p:blipFill>
+        <p:spPr>
+          <a:xfrm>
+            <a:off x="4504383" y="3604087"/>
+            <a:ext cx="582931" cy="595535"/>
+          </a:xfrm>
+          <a:prstGeom prst="rect">
+            <a:avLst/>
+          </a:prstGeom>
+          <a:effectLst>
+            <a:outerShdw blurRad="50800" dist="38100" dir="2700000" algn="tl" rotWithShape="0">
+              <a:prstClr val="black">
+                <a:alpha val="40000"/>
+              </a:prstClr>
+            </a:outerShdw>
+          </a:effectLst>
+        </p:spPr>
+      </p:pic>
     </p:spTree>
     <p:extLst>
       <p:ext uri="{BB962C8B-B14F-4D97-AF65-F5344CB8AC3E}">
@@ -5150,7 +5237,7 @@
             </a:solidFill>
             <a:ln w="38100">
               <a:solidFill>
-                <a:schemeClr val="tx1"/>
+                <a:srgbClr val="1D9BF0"/>
               </a:solidFill>
             </a:ln>
           </p:spPr>
@@ -5204,7 +5291,7 @@
             </a:solidFill>
             <a:ln w="38100">
               <a:solidFill>
-                <a:schemeClr val="tx1"/>
+                <a:srgbClr val="1D9BF0"/>
               </a:solidFill>
             </a:ln>
             <a:effectLst>
@@ -5240,7 +5327,7 @@
               <a:r>
                 <a:rPr kumimoji="1" lang="en-US" altLang="ja-JP" sz="4000" dirty="0">
                   <a:solidFill>
-                    <a:schemeClr val="tx1"/>
+                    <a:srgbClr val="757575"/>
                   </a:solidFill>
                   <a:latin typeface="Abadi" panose="020B0604020104020204" pitchFamily="34" charset="0"/>
                 </a:rPr>
@@ -5248,7 +5335,7 @@
               </a:r>
               <a:endParaRPr kumimoji="1" lang="ja-JP" altLang="en-US" sz="4000" dirty="0">
                 <a:solidFill>
-                  <a:schemeClr val="tx1"/>
+                  <a:srgbClr val="757575"/>
                 </a:solidFill>
                 <a:latin typeface="Abadi" panose="020B0604020104020204" pitchFamily="34" charset="0"/>
               </a:endParaRPr>
@@ -5280,7 +5367,7 @@
             </a:solidFill>
             <a:ln w="38100">
               <a:solidFill>
-                <a:schemeClr val="tx1"/>
+                <a:srgbClr val="1D9BF0"/>
               </a:solidFill>
             </a:ln>
             <a:effectLst>
@@ -5316,7 +5403,7 @@
               <a:r>
                 <a:rPr kumimoji="1" lang="en-US" altLang="ja-JP" sz="4000" dirty="0">
                   <a:solidFill>
-                    <a:schemeClr val="tx1"/>
+                    <a:srgbClr val="757575"/>
                   </a:solidFill>
                   <a:latin typeface="Abadi" panose="020B0604020104020204" pitchFamily="34" charset="0"/>
                 </a:rPr>
@@ -5325,7 +5412,7 @@
               <a:r>
                 <a:rPr lang="en-US" altLang="ja-JP" sz="4000" dirty="0">
                   <a:solidFill>
-                    <a:schemeClr val="tx1"/>
+                    <a:srgbClr val="757575"/>
                   </a:solidFill>
                   <a:latin typeface="Abadi" panose="020B0604020104020204" pitchFamily="34" charset="0"/>
                 </a:rPr>
@@ -5336,7 +5423,7 @@
               <a:r>
                 <a:rPr kumimoji="1" lang="en-US" altLang="ja-JP" sz="4000" dirty="0">
                   <a:solidFill>
-                    <a:schemeClr val="tx1"/>
+                    <a:srgbClr val="757575"/>
                   </a:solidFill>
                   <a:latin typeface="Abadi" panose="020B0604020104020204" pitchFamily="34" charset="0"/>
                 </a:rPr>
@@ -5344,7 +5431,7 @@
               </a:r>
               <a:endParaRPr kumimoji="1" lang="ja-JP" altLang="en-US" sz="4000" dirty="0">
                 <a:solidFill>
-                  <a:schemeClr val="tx1"/>
+                  <a:srgbClr val="757575"/>
                 </a:solidFill>
                 <a:latin typeface="Abadi" panose="020B0604020104020204" pitchFamily="34" charset="0"/>
               </a:endParaRPr>
@@ -5376,7 +5463,7 @@
             </a:solidFill>
             <a:ln w="38100">
               <a:solidFill>
-                <a:schemeClr val="tx1"/>
+                <a:srgbClr val="1D9BF0"/>
               </a:solidFill>
             </a:ln>
             <a:effectLst>
@@ -5412,7 +5499,7 @@
               <a:r>
                 <a:rPr kumimoji="1" lang="en-US" altLang="ja-JP" sz="4000" dirty="0">
                   <a:solidFill>
-                    <a:schemeClr val="tx1"/>
+                    <a:srgbClr val="757575"/>
                   </a:solidFill>
                   <a:latin typeface="Abadi" panose="020B0604020104020204" pitchFamily="34" charset="0"/>
                 </a:rPr>
@@ -5420,7 +5507,7 @@
               </a:r>
               <a:endParaRPr kumimoji="1" lang="ja-JP" altLang="en-US" sz="4000" dirty="0">
                 <a:solidFill>
-                  <a:schemeClr val="tx1"/>
+                  <a:srgbClr val="757575"/>
                 </a:solidFill>
                 <a:latin typeface="Abadi" panose="020B0604020104020204" pitchFamily="34" charset="0"/>
               </a:endParaRPr>
@@ -5452,7 +5539,7 @@
             </a:solidFill>
             <a:ln w="38100">
               <a:solidFill>
-                <a:schemeClr val="tx1"/>
+                <a:srgbClr val="1D9BF0"/>
               </a:solidFill>
             </a:ln>
             <a:effectLst>
@@ -5488,7 +5575,7 @@
               <a:r>
                 <a:rPr kumimoji="1" lang="en-US" altLang="ja-JP" sz="4000" dirty="0">
                   <a:solidFill>
-                    <a:schemeClr val="tx1"/>
+                    <a:srgbClr val="757575"/>
                   </a:solidFill>
                   <a:latin typeface="Abadi" panose="020B0604020104020204" pitchFamily="34" charset="0"/>
                 </a:rPr>
@@ -5497,7 +5584,7 @@
               <a:r>
                 <a:rPr lang="en-US" altLang="ja-JP" sz="4000" dirty="0">
                   <a:solidFill>
-                    <a:schemeClr val="tx1"/>
+                    <a:srgbClr val="757575"/>
                   </a:solidFill>
                   <a:latin typeface="Abadi" panose="020B0604020104020204" pitchFamily="34" charset="0"/>
                 </a:rPr>
@@ -5531,7 +5618,7 @@
             </a:solidFill>
             <a:ln w="38100">
               <a:solidFill>
-                <a:schemeClr val="tx1"/>
+                <a:srgbClr val="1D9BF0"/>
               </a:solidFill>
             </a:ln>
             <a:effectLst>
@@ -5567,7 +5654,7 @@
               <a:r>
                 <a:rPr kumimoji="1" lang="en-US" altLang="ja-JP" sz="4000" dirty="0">
                   <a:solidFill>
-                    <a:schemeClr val="tx1"/>
+                    <a:srgbClr val="757575"/>
                   </a:solidFill>
                   <a:latin typeface="Abadi" panose="020B0604020104020204" pitchFamily="34" charset="0"/>
                 </a:rPr>
@@ -5575,7 +5662,7 @@
               </a:r>
               <a:endParaRPr kumimoji="1" lang="ja-JP" altLang="en-US" sz="4000" dirty="0">
                 <a:solidFill>
-                  <a:schemeClr val="tx1"/>
+                  <a:srgbClr val="757575"/>
                 </a:solidFill>
                 <a:latin typeface="Abadi" panose="020B0604020104020204" pitchFamily="34" charset="0"/>
               </a:endParaRPr>
@@ -5607,7 +5694,7 @@
             </a:solidFill>
             <a:ln w="38100">
               <a:solidFill>
-                <a:schemeClr val="tx1"/>
+                <a:srgbClr val="1D9BF0"/>
               </a:solidFill>
             </a:ln>
             <a:effectLst>
@@ -5643,7 +5730,7 @@
               <a:r>
                 <a:rPr kumimoji="1" lang="en-US" altLang="ja-JP" sz="4000" dirty="0">
                   <a:solidFill>
-                    <a:schemeClr val="tx1"/>
+                    <a:srgbClr val="757575"/>
                   </a:solidFill>
                   <a:latin typeface="Abadi" panose="020B0604020104020204" pitchFamily="34" charset="0"/>
                 </a:rPr>
@@ -5651,7 +5738,7 @@
               </a:r>
               <a:endParaRPr kumimoji="1" lang="ja-JP" altLang="en-US" sz="4000" dirty="0">
                 <a:solidFill>
-                  <a:schemeClr val="tx1"/>
+                  <a:srgbClr val="757575"/>
                 </a:solidFill>
                 <a:latin typeface="Abadi" panose="020B0604020104020204" pitchFamily="34" charset="0"/>
               </a:endParaRPr>
@@ -5683,7 +5770,7 @@
             </a:solidFill>
             <a:ln w="38100">
               <a:solidFill>
-                <a:schemeClr val="tx1"/>
+                <a:srgbClr val="1D9BF0"/>
               </a:solidFill>
             </a:ln>
             <a:effectLst>
@@ -5719,7 +5806,7 @@
               <a:r>
                 <a:rPr kumimoji="1" lang="en-US" altLang="ja-JP" sz="4000" dirty="0">
                   <a:solidFill>
-                    <a:schemeClr val="tx1"/>
+                    <a:srgbClr val="757575"/>
                   </a:solidFill>
                   <a:latin typeface="Abadi" panose="020B0604020104020204" pitchFamily="34" charset="0"/>
                 </a:rPr>
@@ -5727,7 +5814,7 @@
               </a:r>
               <a:endParaRPr kumimoji="1" lang="ja-JP" altLang="en-US" sz="4000" dirty="0">
                 <a:solidFill>
-                  <a:schemeClr val="tx1"/>
+                  <a:srgbClr val="757575"/>
                 </a:solidFill>
                 <a:latin typeface="Abadi" panose="020B0604020104020204" pitchFamily="34" charset="0"/>
               </a:endParaRPr>
@@ -5759,7 +5846,7 @@
             </a:prstGeom>
             <a:ln w="38100">
               <a:solidFill>
-                <a:schemeClr val="tx1"/>
+                <a:srgbClr val="1D9BF0"/>
               </a:solidFill>
               <a:tailEnd type="arrow"/>
             </a:ln>
@@ -5811,7 +5898,7 @@
             </a:prstGeom>
             <a:ln w="38100">
               <a:solidFill>
-                <a:schemeClr val="tx1"/>
+                <a:srgbClr val="1D9BF0"/>
               </a:solidFill>
               <a:tailEnd type="arrow"/>
             </a:ln>
@@ -5863,7 +5950,7 @@
             </a:prstGeom>
             <a:ln w="38100">
               <a:solidFill>
-                <a:schemeClr val="tx1"/>
+                <a:srgbClr val="1D9BF0"/>
               </a:solidFill>
               <a:tailEnd type="arrow"/>
             </a:ln>
@@ -5955,7 +6042,7 @@
             </a:prstGeom>
             <a:ln w="38100">
               <a:solidFill>
-                <a:schemeClr val="tx1"/>
+                <a:srgbClr val="1D9BF0"/>
               </a:solidFill>
               <a:tailEnd type="arrow"/>
             </a:ln>
@@ -6008,7 +6095,7 @@
             </a:prstGeom>
             <a:ln w="38100">
               <a:solidFill>
-                <a:schemeClr val="tx1"/>
+                <a:srgbClr val="1D9BF0"/>
               </a:solidFill>
               <a:tailEnd type="arrow"/>
             </a:ln>
@@ -6154,117 +6241,6 @@
             </p:spPr>
           </p:pic>
         </p:grpSp>
-        <p:pic>
-          <p:nvPicPr>
-            <p:cNvPr id="17" name="Picture 16">
-              <a:extLst>
-                <a:ext uri="{FF2B5EF4-FFF2-40B4-BE49-F238E27FC236}">
-                  <a16:creationId xmlns:a16="http://schemas.microsoft.com/office/drawing/2014/main" id="{7DDD06BA-C783-7B7C-EE58-7C5F1D3BE537}"/>
-                </a:ext>
-              </a:extLst>
-            </p:cNvPr>
-            <p:cNvPicPr>
-              <a:picLocks noChangeAspect="1"/>
-            </p:cNvPicPr>
-            <p:nvPr/>
-          </p:nvPicPr>
-          <p:blipFill>
-            <a:blip r:embed="rId6"/>
-            <a:stretch>
-              <a:fillRect/>
-            </a:stretch>
-          </p:blipFill>
-          <p:spPr>
-            <a:xfrm>
-              <a:off x="8952383" y="3656030"/>
-              <a:ext cx="426201" cy="332186"/>
-            </a:xfrm>
-            <a:prstGeom prst="rect">
-              <a:avLst/>
-            </a:prstGeom>
-            <a:effectLst>
-              <a:outerShdw blurRad="50800" dist="38100" dir="2700000" algn="tl" rotWithShape="0">
-                <a:prstClr val="black">
-                  <a:alpha val="40000"/>
-                </a:prstClr>
-              </a:outerShdw>
-            </a:effectLst>
-          </p:spPr>
-        </p:pic>
-        <p:pic>
-          <p:nvPicPr>
-            <p:cNvPr id="19" name="Picture 18">
-              <a:extLst>
-                <a:ext uri="{FF2B5EF4-FFF2-40B4-BE49-F238E27FC236}">
-                  <a16:creationId xmlns:a16="http://schemas.microsoft.com/office/drawing/2014/main" id="{6DA03032-2D91-ED6B-7E4C-AD841C4D4248}"/>
-                </a:ext>
-              </a:extLst>
-            </p:cNvPr>
-            <p:cNvPicPr>
-              <a:picLocks noChangeAspect="1"/>
-            </p:cNvPicPr>
-            <p:nvPr/>
-          </p:nvPicPr>
-          <p:blipFill>
-            <a:blip r:embed="rId6"/>
-            <a:stretch>
-              <a:fillRect/>
-            </a:stretch>
-          </p:blipFill>
-          <p:spPr>
-            <a:xfrm>
-              <a:off x="8952383" y="4457384"/>
-              <a:ext cx="426201" cy="332186"/>
-            </a:xfrm>
-            <a:prstGeom prst="rect">
-              <a:avLst/>
-            </a:prstGeom>
-            <a:effectLst>
-              <a:outerShdw blurRad="50800" dist="38100" dir="2700000" algn="tl" rotWithShape="0">
-                <a:prstClr val="black">
-                  <a:alpha val="40000"/>
-                </a:prstClr>
-              </a:outerShdw>
-            </a:effectLst>
-          </p:spPr>
-        </p:pic>
-        <p:pic>
-          <p:nvPicPr>
-            <p:cNvPr id="20" name="Picture 19">
-              <a:extLst>
-                <a:ext uri="{FF2B5EF4-FFF2-40B4-BE49-F238E27FC236}">
-                  <a16:creationId xmlns:a16="http://schemas.microsoft.com/office/drawing/2014/main" id="{ACD6167C-71AE-887F-F580-6A84F3FD7F22}"/>
-                </a:ext>
-              </a:extLst>
-            </p:cNvPr>
-            <p:cNvPicPr>
-              <a:picLocks noChangeAspect="1"/>
-            </p:cNvPicPr>
-            <p:nvPr/>
-          </p:nvPicPr>
-          <p:blipFill>
-            <a:blip r:embed="rId6"/>
-            <a:stretch>
-              <a:fillRect/>
-            </a:stretch>
-          </p:blipFill>
-          <p:spPr>
-            <a:xfrm>
-              <a:off x="8952383" y="5275239"/>
-              <a:ext cx="426201" cy="332186"/>
-            </a:xfrm>
-            <a:prstGeom prst="rect">
-              <a:avLst/>
-            </a:prstGeom>
-            <a:effectLst>
-              <a:outerShdw blurRad="50800" dist="38100" dir="2700000" algn="tl" rotWithShape="0">
-                <a:prstClr val="black">
-                  <a:alpha val="40000"/>
-                </a:prstClr>
-              </a:outerShdw>
-            </a:effectLst>
-          </p:spPr>
-        </p:pic>
         <p:sp>
           <p:nvSpPr>
             <p:cNvPr id="26" name="TextBox 25">
@@ -6296,7 +6272,7 @@
               <a:r>
                 <a:rPr lang="en-US" altLang="ja-JP" sz="2400" dirty="0">
                   <a:solidFill>
-                    <a:schemeClr val="tx1"/>
+                    <a:srgbClr val="757575"/>
                   </a:solidFill>
                   <a:latin typeface="Abadi" panose="020B0604020104020204" pitchFamily="34" charset="0"/>
                 </a:rPr>
@@ -6336,13 +6312,16 @@
               <a:r>
                 <a:rPr lang="en-US" altLang="ja-JP" sz="2400" dirty="0">
                   <a:solidFill>
-                    <a:schemeClr val="tx1"/>
+                    <a:srgbClr val="757575"/>
                   </a:solidFill>
                   <a:latin typeface="Abadi" panose="020B0604020104020204" pitchFamily="34" charset="0"/>
                 </a:rPr>
                 <a:t>All projects are managed on the Solana blockchain, which is decentralized, scalable, fast, and energy-efficient blockchain.</a:t>
               </a:r>
               <a:endParaRPr lang="ja-JP" altLang="en-US" sz="2400" dirty="0">
+                <a:solidFill>
+                  <a:srgbClr val="757575"/>
+                </a:solidFill>
                 <a:latin typeface="Abadi" panose="020B0604020104020204" pitchFamily="34" charset="0"/>
               </a:endParaRPr>
             </a:p>
@@ -6383,13 +6362,13 @@
               <p:nvPr/>
             </p:nvPicPr>
             <p:blipFill>
-              <a:blip r:embed="rId7">
+              <a:blip r:embed="rId6">
                 <a:extLst>
                   <a:ext uri="{28A0092B-C50C-407E-A947-70E740481C1C}">
                     <a14:useLocalDpi xmlns:a14="http://schemas.microsoft.com/office/drawing/2010/main" val="0"/>
                   </a:ext>
                   <a:ext uri="{96DAC541-7B7A-43D3-8B79-37D633B846F1}">
-                    <asvg:svgBlip xmlns:asvg="http://schemas.microsoft.com/office/drawing/2016/SVG/main" r:embed="rId8"/>
+                    <asvg:svgBlip xmlns:asvg="http://schemas.microsoft.com/office/drawing/2016/SVG/main" r:embed="rId7"/>
                   </a:ext>
                 </a:extLst>
               </a:blip>
@@ -6422,13 +6401,13 @@
               <p:nvPr/>
             </p:nvPicPr>
             <p:blipFill>
-              <a:blip r:embed="rId9">
+              <a:blip r:embed="rId8">
                 <a:extLst>
                   <a:ext uri="{28A0092B-C50C-407E-A947-70E740481C1C}">
                     <a14:useLocalDpi xmlns:a14="http://schemas.microsoft.com/office/drawing/2010/main" val="0"/>
                   </a:ext>
                   <a:ext uri="{96DAC541-7B7A-43D3-8B79-37D633B846F1}">
-                    <asvg:svgBlip xmlns:asvg="http://schemas.microsoft.com/office/drawing/2016/SVG/main" r:embed="rId10"/>
+                    <asvg:svgBlip xmlns:asvg="http://schemas.microsoft.com/office/drawing/2016/SVG/main" r:embed="rId9"/>
                   </a:ext>
                 </a:extLst>
               </a:blip>
@@ -6479,7 +6458,7 @@
             </a:solidFill>
             <a:ln w="38100">
               <a:solidFill>
-                <a:schemeClr val="tx1"/>
+                <a:srgbClr val="1D9BF0"/>
               </a:solidFill>
             </a:ln>
             <a:effectLst>
@@ -6536,13 +6515,13 @@
             <p:nvPr/>
           </p:nvPicPr>
           <p:blipFill>
-            <a:blip r:embed="rId11">
+            <a:blip r:embed="rId10">
               <a:extLst>
                 <a:ext uri="{28A0092B-C50C-407E-A947-70E740481C1C}">
                   <a14:useLocalDpi xmlns:a14="http://schemas.microsoft.com/office/drawing/2010/main" val="0"/>
                 </a:ext>
                 <a:ext uri="{96DAC541-7B7A-43D3-8B79-37D633B846F1}">
-                  <asvg:svgBlip xmlns:asvg="http://schemas.microsoft.com/office/drawing/2016/SVG/main" r:embed="rId12"/>
+                  <asvg:svgBlip xmlns:asvg="http://schemas.microsoft.com/office/drawing/2016/SVG/main" r:embed="rId11"/>
                 </a:ext>
               </a:extLst>
             </a:blip>
@@ -6568,6 +6547,555 @@
           </p:spPr>
         </p:pic>
       </p:grpSp>
+      <p:sp>
+        <p:nvSpPr>
+          <p:cNvPr id="7" name="Parallelogram 6">
+            <a:extLst>
+              <a:ext uri="{FF2B5EF4-FFF2-40B4-BE49-F238E27FC236}">
+                <a16:creationId xmlns:a16="http://schemas.microsoft.com/office/drawing/2014/main" id="{16EB096F-51AE-D0C2-262D-F39589207EF8}"/>
+              </a:ext>
+            </a:extLst>
+          </p:cNvPr>
+          <p:cNvSpPr/>
+          <p:nvPr/>
+        </p:nvSpPr>
+        <p:spPr>
+          <a:xfrm>
+            <a:off x="8937012" y="3909954"/>
+            <a:ext cx="441572" cy="78262"/>
+          </a:xfrm>
+          <a:prstGeom prst="parallelogram">
+            <a:avLst>
+              <a:gd name="adj" fmla="val 97027"/>
+            </a:avLst>
+          </a:prstGeom>
+          <a:solidFill>
+            <a:srgbClr val="1D9BF0"/>
+          </a:solidFill>
+          <a:ln>
+            <a:noFill/>
+          </a:ln>
+          <a:effectLst>
+            <a:outerShdw blurRad="50800" dist="38100" dir="2700000" algn="tl" rotWithShape="0">
+              <a:prstClr val="black">
+                <a:alpha val="40000"/>
+              </a:prstClr>
+            </a:outerShdw>
+          </a:effectLst>
+        </p:spPr>
+        <p:style>
+          <a:lnRef idx="2">
+            <a:schemeClr val="accent1">
+              <a:shade val="50000"/>
+            </a:schemeClr>
+          </a:lnRef>
+          <a:fillRef idx="1">
+            <a:schemeClr val="accent1"/>
+          </a:fillRef>
+          <a:effectRef idx="0">
+            <a:schemeClr val="accent1"/>
+          </a:effectRef>
+          <a:fontRef idx="minor">
+            <a:schemeClr val="lt1"/>
+          </a:fontRef>
+        </p:style>
+        <p:txBody>
+          <a:bodyPr rtlCol="0" anchor="ctr"/>
+          <a:lstStyle/>
+          <a:p>
+            <a:pPr algn="ctr"/>
+            <a:endParaRPr kumimoji="1" lang="ja-JP" altLang="en-US"/>
+          </a:p>
+        </p:txBody>
+      </p:sp>
+      <p:sp>
+        <p:nvSpPr>
+          <p:cNvPr id="16" name="Parallelogram 15">
+            <a:extLst>
+              <a:ext uri="{FF2B5EF4-FFF2-40B4-BE49-F238E27FC236}">
+                <a16:creationId xmlns:a16="http://schemas.microsoft.com/office/drawing/2014/main" id="{1B62E7F7-80D7-864C-B24B-08AC230446C5}"/>
+              </a:ext>
+            </a:extLst>
+          </p:cNvPr>
+          <p:cNvSpPr/>
+          <p:nvPr/>
+        </p:nvSpPr>
+        <p:spPr>
+          <a:xfrm>
+            <a:off x="8937012" y="3662314"/>
+            <a:ext cx="441572" cy="78262"/>
+          </a:xfrm>
+          <a:prstGeom prst="parallelogram">
+            <a:avLst>
+              <a:gd name="adj" fmla="val 97027"/>
+            </a:avLst>
+          </a:prstGeom>
+          <a:solidFill>
+            <a:srgbClr val="1D9BF0"/>
+          </a:solidFill>
+          <a:ln>
+            <a:noFill/>
+          </a:ln>
+          <a:effectLst>
+            <a:outerShdw blurRad="50800" dist="38100" dir="2700000" algn="tl" rotWithShape="0">
+              <a:prstClr val="black">
+                <a:alpha val="40000"/>
+              </a:prstClr>
+            </a:outerShdw>
+          </a:effectLst>
+        </p:spPr>
+        <p:style>
+          <a:lnRef idx="2">
+            <a:schemeClr val="accent1">
+              <a:shade val="50000"/>
+            </a:schemeClr>
+          </a:lnRef>
+          <a:fillRef idx="1">
+            <a:schemeClr val="accent1"/>
+          </a:fillRef>
+          <a:effectRef idx="0">
+            <a:schemeClr val="accent1"/>
+          </a:effectRef>
+          <a:fontRef idx="minor">
+            <a:schemeClr val="lt1"/>
+          </a:fontRef>
+        </p:style>
+        <p:txBody>
+          <a:bodyPr rtlCol="0" anchor="ctr"/>
+          <a:lstStyle/>
+          <a:p>
+            <a:pPr algn="ctr"/>
+            <a:endParaRPr kumimoji="1" lang="ja-JP" altLang="en-US"/>
+          </a:p>
+        </p:txBody>
+      </p:sp>
+      <p:sp>
+        <p:nvSpPr>
+          <p:cNvPr id="25" name="Parallelogram 24">
+            <a:extLst>
+              <a:ext uri="{FF2B5EF4-FFF2-40B4-BE49-F238E27FC236}">
+                <a16:creationId xmlns:a16="http://schemas.microsoft.com/office/drawing/2014/main" id="{72E59A1B-9008-1FE3-2ACA-D76BDAD4414E}"/>
+              </a:ext>
+            </a:extLst>
+          </p:cNvPr>
+          <p:cNvSpPr/>
+          <p:nvPr/>
+        </p:nvSpPr>
+        <p:spPr>
+          <a:xfrm flipH="1">
+            <a:off x="8937012" y="3783571"/>
+            <a:ext cx="441572" cy="78262"/>
+          </a:xfrm>
+          <a:prstGeom prst="parallelogram">
+            <a:avLst>
+              <a:gd name="adj" fmla="val 97027"/>
+            </a:avLst>
+          </a:prstGeom>
+          <a:solidFill>
+            <a:srgbClr val="1D9BF0"/>
+          </a:solidFill>
+          <a:ln>
+            <a:noFill/>
+          </a:ln>
+          <a:effectLst>
+            <a:outerShdw blurRad="50800" dist="38100" dir="2700000" algn="tl" rotWithShape="0">
+              <a:prstClr val="black">
+                <a:alpha val="40000"/>
+              </a:prstClr>
+            </a:outerShdw>
+          </a:effectLst>
+        </p:spPr>
+        <p:style>
+          <a:lnRef idx="2">
+            <a:schemeClr val="accent1">
+              <a:shade val="50000"/>
+            </a:schemeClr>
+          </a:lnRef>
+          <a:fillRef idx="1">
+            <a:schemeClr val="accent1"/>
+          </a:fillRef>
+          <a:effectRef idx="0">
+            <a:schemeClr val="accent1"/>
+          </a:effectRef>
+          <a:fontRef idx="minor">
+            <a:schemeClr val="lt1"/>
+          </a:fontRef>
+        </p:style>
+        <p:txBody>
+          <a:bodyPr rtlCol="0" anchor="ctr"/>
+          <a:lstStyle/>
+          <a:p>
+            <a:pPr algn="ctr"/>
+            <a:endParaRPr kumimoji="1" lang="ja-JP" altLang="en-US"/>
+          </a:p>
+        </p:txBody>
+      </p:sp>
+      <p:sp>
+        <p:nvSpPr>
+          <p:cNvPr id="28" name="Parallelogram 27">
+            <a:extLst>
+              <a:ext uri="{FF2B5EF4-FFF2-40B4-BE49-F238E27FC236}">
+                <a16:creationId xmlns:a16="http://schemas.microsoft.com/office/drawing/2014/main" id="{04174267-A0EC-2A5F-29BF-C9F1CCBF4386}"/>
+              </a:ext>
+            </a:extLst>
+          </p:cNvPr>
+          <p:cNvSpPr/>
+          <p:nvPr/>
+        </p:nvSpPr>
+        <p:spPr>
+          <a:xfrm>
+            <a:off x="8937012" y="4705024"/>
+            <a:ext cx="441572" cy="78262"/>
+          </a:xfrm>
+          <a:prstGeom prst="parallelogram">
+            <a:avLst>
+              <a:gd name="adj" fmla="val 97027"/>
+            </a:avLst>
+          </a:prstGeom>
+          <a:solidFill>
+            <a:srgbClr val="1D9BF0"/>
+          </a:solidFill>
+          <a:ln>
+            <a:noFill/>
+          </a:ln>
+          <a:effectLst>
+            <a:outerShdw blurRad="50800" dist="38100" dir="2700000" algn="tl" rotWithShape="0">
+              <a:prstClr val="black">
+                <a:alpha val="40000"/>
+              </a:prstClr>
+            </a:outerShdw>
+          </a:effectLst>
+        </p:spPr>
+        <p:style>
+          <a:lnRef idx="2">
+            <a:schemeClr val="accent1">
+              <a:shade val="50000"/>
+            </a:schemeClr>
+          </a:lnRef>
+          <a:fillRef idx="1">
+            <a:schemeClr val="accent1"/>
+          </a:fillRef>
+          <a:effectRef idx="0">
+            <a:schemeClr val="accent1"/>
+          </a:effectRef>
+          <a:fontRef idx="minor">
+            <a:schemeClr val="lt1"/>
+          </a:fontRef>
+        </p:style>
+        <p:txBody>
+          <a:bodyPr rtlCol="0" anchor="ctr"/>
+          <a:lstStyle/>
+          <a:p>
+            <a:pPr algn="ctr"/>
+            <a:endParaRPr kumimoji="1" lang="ja-JP" altLang="en-US"/>
+          </a:p>
+        </p:txBody>
+      </p:sp>
+      <p:sp>
+        <p:nvSpPr>
+          <p:cNvPr id="29" name="Parallelogram 28">
+            <a:extLst>
+              <a:ext uri="{FF2B5EF4-FFF2-40B4-BE49-F238E27FC236}">
+                <a16:creationId xmlns:a16="http://schemas.microsoft.com/office/drawing/2014/main" id="{1DEF2E0B-E1B0-FD0C-81A7-C080F5515B67}"/>
+              </a:ext>
+            </a:extLst>
+          </p:cNvPr>
+          <p:cNvSpPr/>
+          <p:nvPr/>
+        </p:nvSpPr>
+        <p:spPr>
+          <a:xfrm>
+            <a:off x="8937012" y="4457384"/>
+            <a:ext cx="441572" cy="78262"/>
+          </a:xfrm>
+          <a:prstGeom prst="parallelogram">
+            <a:avLst>
+              <a:gd name="adj" fmla="val 97027"/>
+            </a:avLst>
+          </a:prstGeom>
+          <a:solidFill>
+            <a:srgbClr val="1D9BF0"/>
+          </a:solidFill>
+          <a:ln>
+            <a:noFill/>
+          </a:ln>
+          <a:effectLst>
+            <a:outerShdw blurRad="50800" dist="38100" dir="2700000" algn="tl" rotWithShape="0">
+              <a:prstClr val="black">
+                <a:alpha val="40000"/>
+              </a:prstClr>
+            </a:outerShdw>
+          </a:effectLst>
+        </p:spPr>
+        <p:style>
+          <a:lnRef idx="2">
+            <a:schemeClr val="accent1">
+              <a:shade val="50000"/>
+            </a:schemeClr>
+          </a:lnRef>
+          <a:fillRef idx="1">
+            <a:schemeClr val="accent1"/>
+          </a:fillRef>
+          <a:effectRef idx="0">
+            <a:schemeClr val="accent1"/>
+          </a:effectRef>
+          <a:fontRef idx="minor">
+            <a:schemeClr val="lt1"/>
+          </a:fontRef>
+        </p:style>
+        <p:txBody>
+          <a:bodyPr rtlCol="0" anchor="ctr"/>
+          <a:lstStyle/>
+          <a:p>
+            <a:pPr algn="ctr"/>
+            <a:endParaRPr kumimoji="1" lang="ja-JP" altLang="en-US"/>
+          </a:p>
+        </p:txBody>
+      </p:sp>
+      <p:sp>
+        <p:nvSpPr>
+          <p:cNvPr id="33" name="Parallelogram 32">
+            <a:extLst>
+              <a:ext uri="{FF2B5EF4-FFF2-40B4-BE49-F238E27FC236}">
+                <a16:creationId xmlns:a16="http://schemas.microsoft.com/office/drawing/2014/main" id="{841BF0E8-0D24-24D1-A789-8C2C49F4B9DF}"/>
+              </a:ext>
+            </a:extLst>
+          </p:cNvPr>
+          <p:cNvSpPr/>
+          <p:nvPr/>
+        </p:nvSpPr>
+        <p:spPr>
+          <a:xfrm flipH="1">
+            <a:off x="8937012" y="4578641"/>
+            <a:ext cx="441572" cy="78262"/>
+          </a:xfrm>
+          <a:prstGeom prst="parallelogram">
+            <a:avLst>
+              <a:gd name="adj" fmla="val 97027"/>
+            </a:avLst>
+          </a:prstGeom>
+          <a:solidFill>
+            <a:srgbClr val="1D9BF0"/>
+          </a:solidFill>
+          <a:ln>
+            <a:noFill/>
+          </a:ln>
+          <a:effectLst>
+            <a:outerShdw blurRad="50800" dist="38100" dir="2700000" algn="tl" rotWithShape="0">
+              <a:prstClr val="black">
+                <a:alpha val="40000"/>
+              </a:prstClr>
+            </a:outerShdw>
+          </a:effectLst>
+        </p:spPr>
+        <p:style>
+          <a:lnRef idx="2">
+            <a:schemeClr val="accent1">
+              <a:shade val="50000"/>
+            </a:schemeClr>
+          </a:lnRef>
+          <a:fillRef idx="1">
+            <a:schemeClr val="accent1"/>
+          </a:fillRef>
+          <a:effectRef idx="0">
+            <a:schemeClr val="accent1"/>
+          </a:effectRef>
+          <a:fontRef idx="minor">
+            <a:schemeClr val="lt1"/>
+          </a:fontRef>
+        </p:style>
+        <p:txBody>
+          <a:bodyPr rtlCol="0" anchor="ctr"/>
+          <a:lstStyle/>
+          <a:p>
+            <a:pPr algn="ctr"/>
+            <a:endParaRPr kumimoji="1" lang="ja-JP" altLang="en-US"/>
+          </a:p>
+        </p:txBody>
+      </p:sp>
+      <p:sp>
+        <p:nvSpPr>
+          <p:cNvPr id="35" name="Parallelogram 34">
+            <a:extLst>
+              <a:ext uri="{FF2B5EF4-FFF2-40B4-BE49-F238E27FC236}">
+                <a16:creationId xmlns:a16="http://schemas.microsoft.com/office/drawing/2014/main" id="{DC56EFC0-7493-F140-674C-2C28FCFEBA93}"/>
+              </a:ext>
+            </a:extLst>
+          </p:cNvPr>
+          <p:cNvSpPr/>
+          <p:nvPr/>
+        </p:nvSpPr>
+        <p:spPr>
+          <a:xfrm>
+            <a:off x="8937012" y="5522879"/>
+            <a:ext cx="441572" cy="78262"/>
+          </a:xfrm>
+          <a:prstGeom prst="parallelogram">
+            <a:avLst>
+              <a:gd name="adj" fmla="val 97027"/>
+            </a:avLst>
+          </a:prstGeom>
+          <a:solidFill>
+            <a:srgbClr val="1D9BF0"/>
+          </a:solidFill>
+          <a:ln>
+            <a:noFill/>
+          </a:ln>
+          <a:effectLst>
+            <a:outerShdw blurRad="50800" dist="38100" dir="2700000" algn="tl" rotWithShape="0">
+              <a:prstClr val="black">
+                <a:alpha val="40000"/>
+              </a:prstClr>
+            </a:outerShdw>
+          </a:effectLst>
+        </p:spPr>
+        <p:style>
+          <a:lnRef idx="2">
+            <a:schemeClr val="accent1">
+              <a:shade val="50000"/>
+            </a:schemeClr>
+          </a:lnRef>
+          <a:fillRef idx="1">
+            <a:schemeClr val="accent1"/>
+          </a:fillRef>
+          <a:effectRef idx="0">
+            <a:schemeClr val="accent1"/>
+          </a:effectRef>
+          <a:fontRef idx="minor">
+            <a:schemeClr val="lt1"/>
+          </a:fontRef>
+        </p:style>
+        <p:txBody>
+          <a:bodyPr rtlCol="0" anchor="ctr"/>
+          <a:lstStyle/>
+          <a:p>
+            <a:pPr algn="ctr"/>
+            <a:endParaRPr kumimoji="1" lang="ja-JP" altLang="en-US"/>
+          </a:p>
+        </p:txBody>
+      </p:sp>
+      <p:sp>
+        <p:nvSpPr>
+          <p:cNvPr id="36" name="Parallelogram 35">
+            <a:extLst>
+              <a:ext uri="{FF2B5EF4-FFF2-40B4-BE49-F238E27FC236}">
+                <a16:creationId xmlns:a16="http://schemas.microsoft.com/office/drawing/2014/main" id="{5F7A2079-5387-236A-7DB1-495650BF6049}"/>
+              </a:ext>
+            </a:extLst>
+          </p:cNvPr>
+          <p:cNvSpPr/>
+          <p:nvPr/>
+        </p:nvSpPr>
+        <p:spPr>
+          <a:xfrm>
+            <a:off x="8937012" y="5275239"/>
+            <a:ext cx="441572" cy="78262"/>
+          </a:xfrm>
+          <a:prstGeom prst="parallelogram">
+            <a:avLst>
+              <a:gd name="adj" fmla="val 97027"/>
+            </a:avLst>
+          </a:prstGeom>
+          <a:solidFill>
+            <a:srgbClr val="1D9BF0"/>
+          </a:solidFill>
+          <a:ln>
+            <a:noFill/>
+          </a:ln>
+          <a:effectLst>
+            <a:outerShdw blurRad="50800" dist="38100" dir="2700000" algn="tl" rotWithShape="0">
+              <a:prstClr val="black">
+                <a:alpha val="40000"/>
+              </a:prstClr>
+            </a:outerShdw>
+          </a:effectLst>
+        </p:spPr>
+        <p:style>
+          <a:lnRef idx="2">
+            <a:schemeClr val="accent1">
+              <a:shade val="50000"/>
+            </a:schemeClr>
+          </a:lnRef>
+          <a:fillRef idx="1">
+            <a:schemeClr val="accent1"/>
+          </a:fillRef>
+          <a:effectRef idx="0">
+            <a:schemeClr val="accent1"/>
+          </a:effectRef>
+          <a:fontRef idx="minor">
+            <a:schemeClr val="lt1"/>
+          </a:fontRef>
+        </p:style>
+        <p:txBody>
+          <a:bodyPr rtlCol="0" anchor="ctr"/>
+          <a:lstStyle/>
+          <a:p>
+            <a:pPr algn="ctr"/>
+            <a:endParaRPr kumimoji="1" lang="ja-JP" altLang="en-US"/>
+          </a:p>
+        </p:txBody>
+      </p:sp>
+      <p:sp>
+        <p:nvSpPr>
+          <p:cNvPr id="38" name="Parallelogram 37">
+            <a:extLst>
+              <a:ext uri="{FF2B5EF4-FFF2-40B4-BE49-F238E27FC236}">
+                <a16:creationId xmlns:a16="http://schemas.microsoft.com/office/drawing/2014/main" id="{F000C7FF-72CC-4728-E3E4-1A91DF1CEBD6}"/>
+              </a:ext>
+            </a:extLst>
+          </p:cNvPr>
+          <p:cNvSpPr/>
+          <p:nvPr/>
+        </p:nvSpPr>
+        <p:spPr>
+          <a:xfrm flipH="1">
+            <a:off x="8937012" y="5396496"/>
+            <a:ext cx="441572" cy="78262"/>
+          </a:xfrm>
+          <a:prstGeom prst="parallelogram">
+            <a:avLst>
+              <a:gd name="adj" fmla="val 97027"/>
+            </a:avLst>
+          </a:prstGeom>
+          <a:solidFill>
+            <a:srgbClr val="1D9BF0"/>
+          </a:solidFill>
+          <a:ln>
+            <a:noFill/>
+          </a:ln>
+          <a:effectLst>
+            <a:outerShdw blurRad="50800" dist="38100" dir="2700000" algn="tl" rotWithShape="0">
+              <a:prstClr val="black">
+                <a:alpha val="40000"/>
+              </a:prstClr>
+            </a:outerShdw>
+          </a:effectLst>
+        </p:spPr>
+        <p:style>
+          <a:lnRef idx="2">
+            <a:schemeClr val="accent1">
+              <a:shade val="50000"/>
+            </a:schemeClr>
+          </a:lnRef>
+          <a:fillRef idx="1">
+            <a:schemeClr val="accent1"/>
+          </a:fillRef>
+          <a:effectRef idx="0">
+            <a:schemeClr val="accent1"/>
+          </a:effectRef>
+          <a:fontRef idx="minor">
+            <a:schemeClr val="lt1"/>
+          </a:fontRef>
+        </p:style>
+        <p:txBody>
+          <a:bodyPr rtlCol="0" anchor="ctr"/>
+          <a:lstStyle/>
+          <a:p>
+            <a:pPr algn="ctr"/>
+            <a:endParaRPr kumimoji="1" lang="ja-JP" altLang="en-US"/>
+          </a:p>
+        </p:txBody>
+      </p:sp>
     </p:spTree>
     <p:extLst>
       <p:ext uri="{BB962C8B-B14F-4D97-AF65-F5344CB8AC3E}">
@@ -6643,7 +7171,7 @@
             </a:solidFill>
             <a:ln w="38100">
               <a:solidFill>
-                <a:schemeClr val="tx1"/>
+                <a:srgbClr val="1D9BF0"/>
               </a:solidFill>
             </a:ln>
           </p:spPr>
@@ -6697,7 +7225,7 @@
             </a:solidFill>
             <a:ln w="38100">
               <a:solidFill>
-                <a:schemeClr val="tx1"/>
+                <a:srgbClr val="1D9BF0"/>
               </a:solidFill>
             </a:ln>
             <a:effectLst>
@@ -6733,7 +7261,7 @@
               <a:r>
                 <a:rPr kumimoji="1" lang="en-US" altLang="ja-JP" sz="4000" dirty="0">
                   <a:solidFill>
-                    <a:schemeClr val="tx1"/>
+                    <a:srgbClr val="757575"/>
                   </a:solidFill>
                   <a:latin typeface="Abadi" panose="020B0604020104020204" pitchFamily="34" charset="0"/>
                 </a:rPr>
@@ -6742,7 +7270,7 @@
               <a:r>
                 <a:rPr lang="en-US" altLang="ja-JP" sz="4000" dirty="0">
                   <a:solidFill>
-                    <a:schemeClr val="tx1"/>
+                    <a:srgbClr val="757575"/>
                   </a:solidFill>
                   <a:latin typeface="Abadi" panose="020B0604020104020204" pitchFamily="34" charset="0"/>
                 </a:rPr>
@@ -6753,7 +7281,7 @@
               <a:r>
                 <a:rPr kumimoji="1" lang="en-US" altLang="ja-JP" sz="4000" dirty="0">
                   <a:solidFill>
-                    <a:schemeClr val="tx1"/>
+                    <a:srgbClr val="757575"/>
                   </a:solidFill>
                   <a:latin typeface="Abadi" panose="020B0604020104020204" pitchFamily="34" charset="0"/>
                 </a:rPr>
@@ -6761,7 +7289,7 @@
               </a:r>
               <a:endParaRPr kumimoji="1" lang="ja-JP" altLang="en-US" sz="4000" dirty="0">
                 <a:solidFill>
-                  <a:schemeClr val="tx1"/>
+                  <a:srgbClr val="757575"/>
                 </a:solidFill>
                 <a:latin typeface="Abadi" panose="020B0604020104020204" pitchFamily="34" charset="0"/>
               </a:endParaRPr>
@@ -6793,7 +7321,7 @@
             </a:solidFill>
             <a:ln w="38100">
               <a:solidFill>
-                <a:schemeClr val="tx1"/>
+                <a:srgbClr val="1D9BF0"/>
               </a:solidFill>
             </a:ln>
             <a:effectLst>
@@ -6829,7 +7357,7 @@
               <a:r>
                 <a:rPr kumimoji="1" lang="en-US" altLang="ja-JP" sz="4000" dirty="0">
                   <a:solidFill>
-                    <a:schemeClr val="tx1"/>
+                    <a:srgbClr val="757575"/>
                   </a:solidFill>
                   <a:latin typeface="Abadi" panose="020B0604020104020204" pitchFamily="34" charset="0"/>
                 </a:rPr>
@@ -6837,7 +7365,7 @@
               </a:r>
               <a:endParaRPr kumimoji="1" lang="ja-JP" altLang="en-US" sz="4000" dirty="0">
                 <a:solidFill>
-                  <a:schemeClr val="tx1"/>
+                  <a:srgbClr val="757575"/>
                 </a:solidFill>
                 <a:latin typeface="Abadi" panose="020B0604020104020204" pitchFamily="34" charset="0"/>
               </a:endParaRPr>
@@ -6869,7 +7397,7 @@
             </a:solidFill>
             <a:ln w="38100">
               <a:solidFill>
-                <a:schemeClr val="tx1"/>
+                <a:srgbClr val="1D9BF0"/>
               </a:solidFill>
             </a:ln>
             <a:effectLst>
@@ -6905,7 +7433,7 @@
               <a:r>
                 <a:rPr kumimoji="1" lang="en-US" altLang="ja-JP" sz="4000" dirty="0">
                   <a:solidFill>
-                    <a:schemeClr val="tx1"/>
+                    <a:srgbClr val="757575"/>
                   </a:solidFill>
                   <a:latin typeface="Abadi" panose="020B0604020104020204" pitchFamily="34" charset="0"/>
                 </a:rPr>
@@ -6913,7 +7441,7 @@
               </a:r>
               <a:endParaRPr kumimoji="1" lang="ja-JP" altLang="en-US" sz="4000" dirty="0">
                 <a:solidFill>
-                  <a:schemeClr val="tx1"/>
+                  <a:srgbClr val="757575"/>
                 </a:solidFill>
                 <a:latin typeface="Abadi" panose="020B0604020104020204" pitchFamily="34" charset="0"/>
               </a:endParaRPr>
@@ -6945,7 +7473,7 @@
             </a:solidFill>
             <a:ln w="38100">
               <a:solidFill>
-                <a:schemeClr val="tx1"/>
+                <a:srgbClr val="1D9BF0"/>
               </a:solidFill>
             </a:ln>
             <a:effectLst>
@@ -6981,7 +7509,7 @@
               <a:r>
                 <a:rPr kumimoji="1" lang="en-US" altLang="ja-JP" sz="4000" dirty="0">
                   <a:solidFill>
-                    <a:schemeClr val="tx1"/>
+                    <a:srgbClr val="757575"/>
                   </a:solidFill>
                   <a:latin typeface="Abadi" panose="020B0604020104020204" pitchFamily="34" charset="0"/>
                 </a:rPr>
@@ -6990,7 +7518,7 @@
               <a:r>
                 <a:rPr lang="en-US" altLang="ja-JP" sz="4000" dirty="0">
                   <a:solidFill>
-                    <a:schemeClr val="tx1"/>
+                    <a:srgbClr val="757575"/>
                   </a:solidFill>
                   <a:latin typeface="Abadi" panose="020B0604020104020204" pitchFamily="34" charset="0"/>
                 </a:rPr>
@@ -7251,7 +7779,7 @@
             </a:prstGeom>
             <a:ln w="38100">
               <a:solidFill>
-                <a:schemeClr val="tx1"/>
+                <a:srgbClr val="1D9BF0"/>
               </a:solidFill>
               <a:tailEnd type="arrow"/>
             </a:ln>
@@ -7303,7 +7831,7 @@
             </a:prstGeom>
             <a:ln w="38100">
               <a:solidFill>
-                <a:schemeClr val="tx1"/>
+                <a:srgbClr val="1D9BF0"/>
               </a:solidFill>
               <a:tailEnd type="arrow"/>
             </a:ln>
@@ -7330,266 +7858,58 @@
             </a:fontRef>
           </p:style>
         </p:cxnSp>
-        <p:pic>
-          <p:nvPicPr>
-            <p:cNvPr id="19" name="Picture 18">
+        <p:sp>
+          <p:nvSpPr>
+            <p:cNvPr id="32" name="Rectangle 31">
               <a:extLst>
                 <a:ext uri="{FF2B5EF4-FFF2-40B4-BE49-F238E27FC236}">
-                  <a16:creationId xmlns:a16="http://schemas.microsoft.com/office/drawing/2014/main" id="{2A536AF4-F667-F712-A9C9-7476662CF58F}"/>
+                  <a16:creationId xmlns:a16="http://schemas.microsoft.com/office/drawing/2014/main" id="{6A567D29-2A16-EC9B-136F-B9869FFE2027}"/>
                 </a:ext>
               </a:extLst>
             </p:cNvPr>
-            <p:cNvPicPr>
-              <a:picLocks noChangeAspect="1"/>
-            </p:cNvPicPr>
+            <p:cNvSpPr/>
             <p:nvPr/>
-          </p:nvPicPr>
-          <p:blipFill>
-            <a:blip r:embed="rId2"/>
-            <a:stretch>
-              <a:fillRect/>
-            </a:stretch>
-          </p:blipFill>
+          </p:nvSpPr>
           <p:spPr>
             <a:xfrm>
-              <a:off x="4610010" y="1711274"/>
-              <a:ext cx="426201" cy="332186"/>
+              <a:off x="4695826" y="3829979"/>
+              <a:ext cx="731044" cy="711938"/>
             </a:xfrm>
             <a:prstGeom prst="rect">
               <a:avLst/>
             </a:prstGeom>
-            <a:effectLst>
-              <a:outerShdw blurRad="50800" dist="38100" dir="2700000" algn="tl" rotWithShape="0">
-                <a:prstClr val="black">
-                  <a:alpha val="40000"/>
-                </a:prstClr>
-              </a:outerShdw>
-            </a:effectLst>
+            <a:solidFill>
+              <a:schemeClr val="bg1"/>
+            </a:solidFill>
+            <a:ln>
+              <a:noFill/>
+            </a:ln>
           </p:spPr>
-        </p:pic>
-        <p:pic>
-          <p:nvPicPr>
-            <p:cNvPr id="20" name="Picture 19">
-              <a:extLst>
-                <a:ext uri="{FF2B5EF4-FFF2-40B4-BE49-F238E27FC236}">
-                  <a16:creationId xmlns:a16="http://schemas.microsoft.com/office/drawing/2014/main" id="{0B94C63D-5E0F-B50E-FDE4-000975FC4DB4}"/>
-                </a:ext>
-              </a:extLst>
-            </p:cNvPr>
-            <p:cNvPicPr>
-              <a:picLocks noChangeAspect="1"/>
-            </p:cNvPicPr>
-            <p:nvPr/>
-          </p:nvPicPr>
-          <p:blipFill>
-            <a:blip r:embed="rId2"/>
-            <a:stretch>
-              <a:fillRect/>
-            </a:stretch>
-          </p:blipFill>
-          <p:spPr>
-            <a:xfrm>
-              <a:off x="5063862" y="1711274"/>
-              <a:ext cx="426201" cy="332186"/>
-            </a:xfrm>
-            <a:prstGeom prst="rect">
-              <a:avLst/>
-            </a:prstGeom>
-            <a:effectLst>
-              <a:outerShdw blurRad="50800" dist="38100" dir="2700000" algn="tl" rotWithShape="0">
-                <a:prstClr val="black">
-                  <a:alpha val="40000"/>
-                </a:prstClr>
-              </a:outerShdw>
-            </a:effectLst>
-          </p:spPr>
-        </p:pic>
-        <p:pic>
-          <p:nvPicPr>
-            <p:cNvPr id="21" name="Picture 20">
-              <a:extLst>
-                <a:ext uri="{FF2B5EF4-FFF2-40B4-BE49-F238E27FC236}">
-                  <a16:creationId xmlns:a16="http://schemas.microsoft.com/office/drawing/2014/main" id="{47BDFE8D-8850-703E-3D90-75315424B70F}"/>
-                </a:ext>
-              </a:extLst>
-            </p:cNvPr>
-            <p:cNvPicPr>
-              <a:picLocks noChangeAspect="1"/>
-            </p:cNvPicPr>
-            <p:nvPr/>
-          </p:nvPicPr>
-          <p:blipFill>
-            <a:blip r:embed="rId2"/>
-            <a:stretch>
-              <a:fillRect/>
-            </a:stretch>
-          </p:blipFill>
-          <p:spPr>
-            <a:xfrm>
-              <a:off x="4836936" y="2077640"/>
-              <a:ext cx="426201" cy="332186"/>
-            </a:xfrm>
-            <a:prstGeom prst="rect">
-              <a:avLst/>
-            </a:prstGeom>
-            <a:effectLst>
-              <a:outerShdw blurRad="50800" dist="38100" dir="2700000" algn="tl" rotWithShape="0">
-                <a:prstClr val="black">
-                  <a:alpha val="40000"/>
-                </a:prstClr>
-              </a:outerShdw>
-            </a:effectLst>
-          </p:spPr>
-        </p:pic>
-        <p:grpSp>
-          <p:nvGrpSpPr>
-            <p:cNvPr id="33" name="Group 32">
-              <a:extLst>
-                <a:ext uri="{FF2B5EF4-FFF2-40B4-BE49-F238E27FC236}">
-                  <a16:creationId xmlns:a16="http://schemas.microsoft.com/office/drawing/2014/main" id="{ACE9E6D8-CEA7-E84B-AE05-2538C4DC2159}"/>
-                </a:ext>
-              </a:extLst>
-            </p:cNvPr>
-            <p:cNvGrpSpPr/>
-            <p:nvPr/>
-          </p:nvGrpSpPr>
-          <p:grpSpPr>
-            <a:xfrm>
-              <a:off x="4420203" y="3787534"/>
-              <a:ext cx="1080521" cy="876422"/>
-              <a:chOff x="4420203" y="4334701"/>
-              <a:chExt cx="1080521" cy="876422"/>
-            </a:xfrm>
-          </p:grpSpPr>
-          <p:sp>
-            <p:nvSpPr>
-              <p:cNvPr id="32" name="Rectangle 31">
-                <a:extLst>
-                  <a:ext uri="{FF2B5EF4-FFF2-40B4-BE49-F238E27FC236}">
-                    <a16:creationId xmlns:a16="http://schemas.microsoft.com/office/drawing/2014/main" id="{6A567D29-2A16-EC9B-136F-B9869FFE2027}"/>
-                  </a:ext>
-                </a:extLst>
-              </p:cNvPr>
-              <p:cNvSpPr/>
-              <p:nvPr/>
-            </p:nvSpPr>
-            <p:spPr>
-              <a:xfrm>
-                <a:off x="4695826" y="4377146"/>
-                <a:ext cx="731044" cy="711938"/>
-              </a:xfrm>
-              <a:prstGeom prst="rect">
-                <a:avLst/>
-              </a:prstGeom>
-              <a:solidFill>
-                <a:schemeClr val="bg1"/>
-              </a:solidFill>
-              <a:ln>
-                <a:noFill/>
-              </a:ln>
-            </p:spPr>
-            <p:style>
-              <a:lnRef idx="2">
-                <a:schemeClr val="accent1">
-                  <a:shade val="50000"/>
-                </a:schemeClr>
-              </a:lnRef>
-              <a:fillRef idx="1">
-                <a:schemeClr val="accent1"/>
-              </a:fillRef>
-              <a:effectRef idx="0">
-                <a:schemeClr val="accent1"/>
-              </a:effectRef>
-              <a:fontRef idx="minor">
-                <a:schemeClr val="lt1"/>
-              </a:fontRef>
-            </p:style>
-            <p:txBody>
-              <a:bodyPr rtlCol="0" anchor="ctr"/>
-              <a:lstStyle/>
-              <a:p>
-                <a:pPr algn="ctr"/>
-                <a:endParaRPr kumimoji="1" lang="ja-JP" altLang="en-US"/>
-              </a:p>
-            </p:txBody>
-          </p:sp>
-          <p:pic>
-            <p:nvPicPr>
-              <p:cNvPr id="29" name="Picture 28">
-                <a:extLst>
-                  <a:ext uri="{FF2B5EF4-FFF2-40B4-BE49-F238E27FC236}">
-                    <a16:creationId xmlns:a16="http://schemas.microsoft.com/office/drawing/2014/main" id="{0BDC6565-6B96-FADE-E0ED-EB2387CB25B4}"/>
-                  </a:ext>
-                </a:extLst>
-              </p:cNvPr>
-              <p:cNvPicPr>
-                <a:picLocks noChangeAspect="1"/>
-              </p:cNvPicPr>
-              <p:nvPr/>
-            </p:nvPicPr>
-            <p:blipFill>
-              <a:blip r:embed="rId3"/>
-              <a:stretch>
-                <a:fillRect/>
-              </a:stretch>
-            </p:blipFill>
-            <p:spPr>
-              <a:xfrm>
-                <a:off x="4624302" y="4334701"/>
-                <a:ext cx="876422" cy="876422"/>
-              </a:xfrm>
-              <a:prstGeom prst="rect">
-                <a:avLst/>
-              </a:prstGeom>
-              <a:noFill/>
-              <a:effectLst>
-                <a:outerShdw blurRad="50800" dist="38100" dir="2700000" algn="tl" rotWithShape="0">
-                  <a:prstClr val="black">
-                    <a:alpha val="40000"/>
-                  </a:prstClr>
-                </a:outerShdw>
-              </a:effectLst>
-            </p:spPr>
-          </p:pic>
-          <p:pic>
-            <p:nvPicPr>
-              <p:cNvPr id="31" name="Picture 30">
-                <a:extLst>
-                  <a:ext uri="{FF2B5EF4-FFF2-40B4-BE49-F238E27FC236}">
-                    <a16:creationId xmlns:a16="http://schemas.microsoft.com/office/drawing/2014/main" id="{85276DD5-FDD8-5611-9287-5E077140874D}"/>
-                  </a:ext>
-                </a:extLst>
-              </p:cNvPr>
-              <p:cNvPicPr>
-                <a:picLocks noChangeAspect="1"/>
-              </p:cNvPicPr>
-              <p:nvPr/>
-            </p:nvPicPr>
-            <p:blipFill>
-              <a:blip r:embed="rId4"/>
-              <a:stretch>
-                <a:fillRect/>
-              </a:stretch>
-            </p:blipFill>
-            <p:spPr>
-              <a:xfrm>
-                <a:off x="4420203" y="4456851"/>
-                <a:ext cx="543001" cy="552527"/>
-              </a:xfrm>
-              <a:prstGeom prst="rect">
-                <a:avLst/>
-              </a:prstGeom>
-              <a:noFill/>
-              <a:effectLst>
-                <a:outerShdw blurRad="50800" dist="38100" dir="2700000" algn="tl" rotWithShape="0">
-                  <a:prstClr val="black">
-                    <a:alpha val="40000"/>
-                  </a:prstClr>
-                </a:outerShdw>
-              </a:effectLst>
-            </p:spPr>
-          </p:pic>
-        </p:grpSp>
+          <p:style>
+            <a:lnRef idx="2">
+              <a:schemeClr val="accent1">
+                <a:shade val="50000"/>
+              </a:schemeClr>
+            </a:lnRef>
+            <a:fillRef idx="1">
+              <a:schemeClr val="accent1"/>
+            </a:fillRef>
+            <a:effectRef idx="0">
+              <a:schemeClr val="accent1"/>
+            </a:effectRef>
+            <a:fontRef idx="minor">
+              <a:schemeClr val="lt1"/>
+            </a:fontRef>
+          </p:style>
+          <p:txBody>
+            <a:bodyPr rtlCol="0" anchor="ctr"/>
+            <a:lstStyle/>
+            <a:p>
+              <a:pPr algn="ctr"/>
+              <a:endParaRPr kumimoji="1" lang="ja-JP" altLang="en-US"/>
+            </a:p>
+          </p:txBody>
+        </p:sp>
         <p:cxnSp>
           <p:nvCxnSpPr>
             <p:cNvPr id="35" name="Connector: Curved 34">
@@ -7618,7 +7938,7 @@
             </a:prstGeom>
             <a:ln w="38100">
               <a:solidFill>
-                <a:schemeClr val="tx1"/>
+                <a:srgbClr val="1D9BF0"/>
               </a:solidFill>
               <a:tailEnd type="arrow"/>
             </a:ln>
@@ -7669,7 +7989,7 @@
             </a:prstGeom>
             <a:ln w="38100">
               <a:solidFill>
-                <a:schemeClr val="tx1"/>
+                <a:srgbClr val="1D9BF0"/>
               </a:solidFill>
               <a:tailEnd type="arrow"/>
             </a:ln>
@@ -7826,18 +8146,12 @@
             <a:p>
               <a:r>
                 <a:rPr lang="en-US" altLang="ja-JP" sz="2400" dirty="0">
-                  <a:latin typeface="Abadi" panose="020B0604020104020204" pitchFamily="34" charset="0"/>
-                </a:rPr>
-                <a:t>As like the opened vault, </a:t>
-              </a:r>
-              <a:r>
-                <a:rPr lang="en-US" altLang="ja-JP" sz="2400" dirty="0">
                   <a:solidFill>
-                    <a:schemeClr val="tx1"/>
+                    <a:srgbClr val="757575"/>
                   </a:solidFill>
                   <a:latin typeface="Abadi" panose="020B0604020104020204" pitchFamily="34" charset="0"/>
                 </a:rPr>
-                <a:t>the NPO/NGO/Government can withdraw the pooled Solana to support the Country ABC</a:t>
+                <a:t>As like the opened vault, the NPO/NGO/Government can withdraw the pooled Solana to support the Country ABC</a:t>
               </a:r>
             </a:p>
           </p:txBody>
@@ -7909,13 +8223,13 @@
             <p:nvPr/>
           </p:nvPicPr>
           <p:blipFill>
-            <a:blip r:embed="rId5">
+            <a:blip r:embed="rId2">
               <a:extLst>
                 <a:ext uri="{28A0092B-C50C-407E-A947-70E740481C1C}">
                   <a14:useLocalDpi xmlns:a14="http://schemas.microsoft.com/office/drawing/2010/main" val="0"/>
                 </a:ext>
                 <a:ext uri="{96DAC541-7B7A-43D3-8B79-37D633B846F1}">
-                  <asvg:svgBlip xmlns:asvg="http://schemas.microsoft.com/office/drawing/2016/SVG/main" r:embed="rId6"/>
+                  <asvg:svgBlip xmlns:asvg="http://schemas.microsoft.com/office/drawing/2016/SVG/main" r:embed="rId3"/>
                 </a:ext>
               </a:extLst>
             </a:blip>
@@ -7964,7 +8278,7 @@
             </a:prstGeom>
             <a:ln w="38100">
               <a:solidFill>
-                <a:schemeClr val="tx1"/>
+                <a:srgbClr val="1D9BF0"/>
               </a:solidFill>
               <a:tailEnd type="arrow"/>
             </a:ln>
@@ -8015,7 +8329,7 @@
             </a:prstGeom>
             <a:ln w="38100">
               <a:solidFill>
-                <a:schemeClr val="tx1"/>
+                <a:srgbClr val="1D9BF0"/>
               </a:solidFill>
               <a:tailEnd type="arrow"/>
             </a:ln>
@@ -8066,7 +8380,7 @@
             </a:prstGeom>
             <a:ln w="38100">
               <a:solidFill>
-                <a:schemeClr val="tx1"/>
+                <a:srgbClr val="1D9BF0"/>
               </a:solidFill>
               <a:tailEnd type="arrow"/>
             </a:ln>
@@ -8142,7 +8456,7 @@
               </a:solidFill>
               <a:ln w="38100">
                 <a:solidFill>
-                  <a:schemeClr val="tx1"/>
+                  <a:srgbClr val="1D9BF0"/>
                 </a:solidFill>
               </a:ln>
               <a:effectLst>
@@ -8234,11 +8548,18 @@
                 <a:p>
                   <a:r>
                     <a:rPr lang="en-US" altLang="ja-JP" sz="2400" b="1" dirty="0">
+                      <a:solidFill>
+                        <a:srgbClr val="757575"/>
+                      </a:solidFill>
                       <a:latin typeface="Abadi" panose="020B0604020104020204" pitchFamily="34" charset="0"/>
                     </a:rPr>
                     <a:t>Backer 1</a:t>
                   </a:r>
-                  <a:endParaRPr lang="ja-JP" altLang="en-US" sz="2400" b="1" dirty="0"/>
+                  <a:endParaRPr lang="ja-JP" altLang="en-US" sz="2400" b="1" dirty="0">
+                    <a:solidFill>
+                      <a:srgbClr val="757575"/>
+                    </a:solidFill>
+                  </a:endParaRPr>
                 </a:p>
               </p:txBody>
             </p:sp>
@@ -8257,13 +8578,13 @@
                 <p:nvPr/>
               </p:nvPicPr>
               <p:blipFill>
-                <a:blip r:embed="rId7">
+                <a:blip r:embed="rId4">
                   <a:extLst>
                     <a:ext uri="{28A0092B-C50C-407E-A947-70E740481C1C}">
                       <a14:useLocalDpi xmlns:a14="http://schemas.microsoft.com/office/drawing/2010/main" val="0"/>
                     </a:ext>
                     <a:ext uri="{96DAC541-7B7A-43D3-8B79-37D633B846F1}">
-                      <asvg:svgBlip xmlns:asvg="http://schemas.microsoft.com/office/drawing/2016/SVG/main" r:embed="rId8"/>
+                      <asvg:svgBlip xmlns:asvg="http://schemas.microsoft.com/office/drawing/2016/SVG/main" r:embed="rId5"/>
                     </a:ext>
                   </a:extLst>
                 </a:blip>
@@ -8319,6 +8640,9 @@
                   <a:pPr algn="ctr"/>
                   <a:r>
                     <a:rPr lang="en-US" altLang="ja-JP" sz="2400" u="sng" dirty="0">
+                      <a:solidFill>
+                        <a:srgbClr val="757575"/>
+                      </a:solidFill>
                       <a:latin typeface="Abadi" panose="020B0604020104020204" pitchFamily="34" charset="0"/>
                     </a:rPr>
                     <a:t>Happen</a:t>
@@ -8328,11 +8652,18 @@
                   <a:pPr algn="ctr"/>
                   <a:r>
                     <a:rPr lang="en-US" altLang="ja-JP" sz="2400" dirty="0">
+                      <a:solidFill>
+                        <a:srgbClr val="757575"/>
+                      </a:solidFill>
                       <a:latin typeface="Abadi" panose="020B0604020104020204" pitchFamily="34" charset="0"/>
                     </a:rPr>
                     <a:t>1 SOL</a:t>
                   </a:r>
-                  <a:endParaRPr lang="ja-JP" altLang="en-US" sz="2400" dirty="0"/>
+                  <a:endParaRPr lang="ja-JP" altLang="en-US" sz="2400" dirty="0">
+                    <a:solidFill>
+                      <a:srgbClr val="757575"/>
+                    </a:solidFill>
+                  </a:endParaRPr>
                 </a:p>
               </p:txBody>
             </p:sp>
@@ -8367,6 +8698,9 @@
                   <a:pPr algn="ctr"/>
                   <a:r>
                     <a:rPr lang="en-US" altLang="ja-JP" sz="2400" u="sng" dirty="0">
+                      <a:solidFill>
+                        <a:srgbClr val="757575"/>
+                      </a:solidFill>
                       <a:latin typeface="Abadi" panose="020B0604020104020204" pitchFamily="34" charset="0"/>
                     </a:rPr>
                     <a:t>Happen</a:t>
@@ -8376,11 +8710,18 @@
                   <a:pPr algn="ctr"/>
                   <a:r>
                     <a:rPr lang="en-US" altLang="ja-JP" sz="2400" dirty="0">
+                      <a:solidFill>
+                        <a:srgbClr val="757575"/>
+                      </a:solidFill>
                       <a:latin typeface="Abadi" panose="020B0604020104020204" pitchFamily="34" charset="0"/>
                     </a:rPr>
                     <a:t>1.5 SOL</a:t>
                   </a:r>
-                  <a:endParaRPr lang="ja-JP" altLang="en-US" sz="2400" dirty="0"/>
+                  <a:endParaRPr lang="ja-JP" altLang="en-US" sz="2400" dirty="0">
+                    <a:solidFill>
+                      <a:srgbClr val="757575"/>
+                    </a:solidFill>
+                  </a:endParaRPr>
                 </a:p>
               </p:txBody>
             </p:sp>
@@ -8415,6 +8756,9 @@
                   <a:pPr algn="ctr"/>
                   <a:r>
                     <a:rPr lang="en-US" altLang="ja-JP" sz="2400" u="sng" dirty="0">
+                      <a:solidFill>
+                        <a:srgbClr val="757575"/>
+                      </a:solidFill>
                       <a:latin typeface="Abadi" panose="020B0604020104020204" pitchFamily="34" charset="0"/>
                     </a:rPr>
                     <a:t>Not happen</a:t>
@@ -8424,11 +8768,18 @@
                   <a:pPr algn="ctr"/>
                   <a:r>
                     <a:rPr lang="en-US" altLang="ja-JP" sz="2400" dirty="0">
+                      <a:solidFill>
+                        <a:srgbClr val="757575"/>
+                      </a:solidFill>
                       <a:latin typeface="Abadi" panose="020B0604020104020204" pitchFamily="34" charset="0"/>
                     </a:rPr>
                     <a:t>1.2 SOL</a:t>
                   </a:r>
-                  <a:endParaRPr lang="ja-JP" altLang="en-US" sz="2400" dirty="0"/>
+                  <a:endParaRPr lang="ja-JP" altLang="en-US" sz="2400" dirty="0">
+                    <a:solidFill>
+                      <a:srgbClr val="757575"/>
+                    </a:solidFill>
+                  </a:endParaRPr>
                 </a:p>
               </p:txBody>
             </p:sp>
@@ -8483,11 +8834,18 @@
                 <a:p>
                   <a:r>
                     <a:rPr lang="en-US" altLang="ja-JP" sz="2400" b="1" dirty="0">
+                      <a:solidFill>
+                        <a:srgbClr val="757575"/>
+                      </a:solidFill>
                       <a:latin typeface="Abadi" panose="020B0604020104020204" pitchFamily="34" charset="0"/>
                     </a:rPr>
                     <a:t>Backer 2</a:t>
                   </a:r>
-                  <a:endParaRPr lang="ja-JP" altLang="en-US" sz="2400" b="1" dirty="0"/>
+                  <a:endParaRPr lang="ja-JP" altLang="en-US" sz="2400" b="1" dirty="0">
+                    <a:solidFill>
+                      <a:srgbClr val="757575"/>
+                    </a:solidFill>
+                  </a:endParaRPr>
                 </a:p>
               </p:txBody>
             </p:sp>
@@ -8506,13 +8864,13 @@
                 <p:nvPr/>
               </p:nvPicPr>
               <p:blipFill>
-                <a:blip r:embed="rId7">
+                <a:blip r:embed="rId4">
                   <a:extLst>
                     <a:ext uri="{28A0092B-C50C-407E-A947-70E740481C1C}">
                       <a14:useLocalDpi xmlns:a14="http://schemas.microsoft.com/office/drawing/2010/main" val="0"/>
                     </a:ext>
                     <a:ext uri="{96DAC541-7B7A-43D3-8B79-37D633B846F1}">
-                      <asvg:svgBlip xmlns:asvg="http://schemas.microsoft.com/office/drawing/2016/SVG/main" r:embed="rId8"/>
+                      <asvg:svgBlip xmlns:asvg="http://schemas.microsoft.com/office/drawing/2016/SVG/main" r:embed="rId5"/>
                     </a:ext>
                   </a:extLst>
                 </a:blip>
@@ -8568,6 +8926,9 @@
                   <a:pPr algn="ctr"/>
                   <a:r>
                     <a:rPr lang="en-US" altLang="ja-JP" sz="2400" u="sng" dirty="0">
+                      <a:solidFill>
+                        <a:srgbClr val="757575"/>
+                      </a:solidFill>
                       <a:latin typeface="Abadi" panose="020B0604020104020204" pitchFamily="34" charset="0"/>
                     </a:rPr>
                     <a:t>Happen</a:t>
@@ -8577,11 +8938,18 @@
                   <a:pPr algn="ctr"/>
                   <a:r>
                     <a:rPr lang="en-US" altLang="ja-JP" sz="2400" dirty="0">
+                      <a:solidFill>
+                        <a:srgbClr val="757575"/>
+                      </a:solidFill>
                       <a:latin typeface="Abadi" panose="020B0604020104020204" pitchFamily="34" charset="0"/>
                     </a:rPr>
                     <a:t>0.5 SOL</a:t>
                   </a:r>
-                  <a:endParaRPr lang="ja-JP" altLang="en-US" sz="2400" dirty="0"/>
+                  <a:endParaRPr lang="ja-JP" altLang="en-US" sz="2400" dirty="0">
+                    <a:solidFill>
+                      <a:srgbClr val="757575"/>
+                    </a:solidFill>
+                  </a:endParaRPr>
                 </a:p>
               </p:txBody>
             </p:sp>
@@ -8636,11 +9004,18 @@
                 <a:p>
                   <a:r>
                     <a:rPr lang="en-US" altLang="ja-JP" sz="2400" b="1" dirty="0">
+                      <a:solidFill>
+                        <a:srgbClr val="757575"/>
+                      </a:solidFill>
                       <a:latin typeface="Abadi" panose="020B0604020104020204" pitchFamily="34" charset="0"/>
                     </a:rPr>
                     <a:t>Backer 3</a:t>
                   </a:r>
-                  <a:endParaRPr lang="ja-JP" altLang="en-US" sz="2400" b="1" dirty="0"/>
+                  <a:endParaRPr lang="ja-JP" altLang="en-US" sz="2400" b="1" dirty="0">
+                    <a:solidFill>
+                      <a:srgbClr val="757575"/>
+                    </a:solidFill>
+                  </a:endParaRPr>
                 </a:p>
               </p:txBody>
             </p:sp>
@@ -8659,13 +9034,13 @@
                 <p:nvPr/>
               </p:nvPicPr>
               <p:blipFill>
-                <a:blip r:embed="rId7">
+                <a:blip r:embed="rId4">
                   <a:extLst>
                     <a:ext uri="{28A0092B-C50C-407E-A947-70E740481C1C}">
                       <a14:useLocalDpi xmlns:a14="http://schemas.microsoft.com/office/drawing/2010/main" val="0"/>
                     </a:ext>
                     <a:ext uri="{96DAC541-7B7A-43D3-8B79-37D633B846F1}">
-                      <asvg:svgBlip xmlns:asvg="http://schemas.microsoft.com/office/drawing/2016/SVG/main" r:embed="rId8"/>
+                      <asvg:svgBlip xmlns:asvg="http://schemas.microsoft.com/office/drawing/2016/SVG/main" r:embed="rId5"/>
                     </a:ext>
                   </a:extLst>
                 </a:blip>
@@ -8721,6 +9096,9 @@
                   <a:pPr algn="ctr"/>
                   <a:r>
                     <a:rPr lang="en-US" altLang="ja-JP" sz="2400" u="sng" dirty="0">
+                      <a:solidFill>
+                        <a:srgbClr val="757575"/>
+                      </a:solidFill>
                       <a:latin typeface="Abadi" panose="020B0604020104020204" pitchFamily="34" charset="0"/>
                     </a:rPr>
                     <a:t>Not happen</a:t>
@@ -8730,11 +9108,18 @@
                   <a:pPr algn="ctr"/>
                   <a:r>
                     <a:rPr lang="en-US" altLang="ja-JP" sz="2400" dirty="0">
+                      <a:solidFill>
+                        <a:srgbClr val="757575"/>
+                      </a:solidFill>
                       <a:latin typeface="Abadi" panose="020B0604020104020204" pitchFamily="34" charset="0"/>
                     </a:rPr>
                     <a:t>1.2 SOL</a:t>
                   </a:r>
-                  <a:endParaRPr lang="ja-JP" altLang="en-US" sz="2400" dirty="0"/>
+                  <a:endParaRPr lang="ja-JP" altLang="en-US" sz="2400" dirty="0">
+                    <a:solidFill>
+                      <a:srgbClr val="757575"/>
+                    </a:solidFill>
+                  </a:endParaRPr>
                 </a:p>
               </p:txBody>
             </p:sp>
@@ -8766,11 +9151,11 @@
                 </a:avLst>
               </a:prstGeom>
               <a:solidFill>
-                <a:schemeClr val="bg1"/>
+                <a:srgbClr val="1D9BF0"/>
               </a:solidFill>
               <a:ln w="38100">
                 <a:solidFill>
-                  <a:schemeClr val="tx1"/>
+                  <a:srgbClr val="1D9BF0"/>
                 </a:solidFill>
                 <a:headEnd type="oval"/>
                 <a:tailEnd type="oval"/>
@@ -8821,11 +9206,11 @@
                 <a:avLst/>
               </a:prstGeom>
               <a:solidFill>
-                <a:schemeClr val="bg1"/>
+                <a:srgbClr val="1D9BF0"/>
               </a:solidFill>
               <a:ln w="38100">
                 <a:solidFill>
-                  <a:schemeClr val="tx1"/>
+                  <a:srgbClr val="1D9BF0"/>
                 </a:solidFill>
                 <a:headEnd type="oval"/>
                 <a:tailEnd type="arrow"/>
@@ -8879,11 +9264,11 @@
                 <a:avLst/>
               </a:prstGeom>
               <a:solidFill>
-                <a:schemeClr val="bg1"/>
+                <a:srgbClr val="1D9BF0"/>
               </a:solidFill>
               <a:ln w="38100">
                 <a:solidFill>
-                  <a:schemeClr val="tx1"/>
+                  <a:srgbClr val="1D9BF0"/>
                 </a:solidFill>
                 <a:headEnd type="oval"/>
                 <a:tailEnd type="arrow"/>
@@ -8945,7 +9330,7 @@
               <a:r>
                 <a:rPr lang="en-US" altLang="ja-JP" sz="2400" dirty="0">
                   <a:solidFill>
-                    <a:schemeClr val="tx1"/>
+                    <a:srgbClr val="757575"/>
                   </a:solidFill>
                   <a:latin typeface="Abadi" panose="020B0604020104020204" pitchFamily="34" charset="0"/>
                 </a:rPr>
@@ -8977,7 +9362,7 @@
             <a:noFill/>
             <a:ln w="76200">
               <a:solidFill>
-                <a:srgbClr val="FF0000"/>
+                <a:srgbClr val="F09BF0"/>
               </a:solidFill>
             </a:ln>
             <a:effectLst>
@@ -9027,9 +9412,9 @@
           </p:nvGrpSpPr>
           <p:grpSpPr>
             <a:xfrm rot="376611">
-              <a:off x="5216225" y="4700291"/>
+              <a:off x="5285198" y="4760399"/>
               <a:ext cx="2939895" cy="780420"/>
-              <a:chOff x="5047352" y="4873269"/>
+              <a:chOff x="5122484" y="4925475"/>
               <a:chExt cx="2939895" cy="780420"/>
             </a:xfrm>
           </p:grpSpPr>
@@ -9047,7 +9432,7 @@
             </p:nvSpPr>
             <p:spPr>
               <a:xfrm rot="17997790" flipV="1">
-                <a:off x="6127090" y="3793531"/>
+                <a:off x="6202222" y="3845737"/>
                 <a:ext cx="780420" cy="2939895"/>
               </a:xfrm>
               <a:prstGeom prst="downArrow">
@@ -9058,7 +9443,7 @@
               </a:solidFill>
               <a:ln w="38100">
                 <a:solidFill>
-                  <a:srgbClr val="FF0000"/>
+                  <a:srgbClr val="F09BF0"/>
                 </a:solidFill>
               </a:ln>
               <a:effectLst>
@@ -9093,7 +9478,7 @@
               <a:p>
                 <a:endParaRPr lang="ja-JP" altLang="en-US" sz="4000" dirty="0">
                   <a:solidFill>
-                    <a:schemeClr val="tx1"/>
+                    <a:srgbClr val="F09BF0"/>
                   </a:solidFill>
                   <a:latin typeface="Abadi" panose="020B0604020104020204" pitchFamily="34" charset="0"/>
                 </a:endParaRPr>
@@ -9114,7 +9499,7 @@
             </p:nvSpPr>
             <p:spPr>
               <a:xfrm rot="1779378">
-                <a:off x="5522410" y="5065861"/>
+                <a:off x="5597542" y="5118066"/>
                 <a:ext cx="2159566" cy="461665"/>
               </a:xfrm>
               <a:prstGeom prst="rect">
@@ -9131,7 +9516,7 @@
                 <a:r>
                   <a:rPr lang="en-US" altLang="ja-JP" sz="2400" b="1" dirty="0">
                     <a:solidFill>
-                      <a:srgbClr val="FF0000"/>
+                      <a:srgbClr val="F09BF0"/>
                     </a:solidFill>
                     <a:latin typeface="Abadi" panose="020B0604020104020204" pitchFamily="34" charset="0"/>
                   </a:rPr>
@@ -9139,7 +9524,7 @@
                 </a:r>
                 <a:endParaRPr lang="ja-JP" altLang="en-US" sz="2400" b="1" dirty="0">
                   <a:solidFill>
-                    <a:srgbClr val="FF0000"/>
+                    <a:srgbClr val="F09BF0"/>
                   </a:solidFill>
                   <a:latin typeface="Abadi" panose="020B0604020104020204" pitchFamily="34" charset="0"/>
                 </a:endParaRPr>
@@ -9148,6 +9533,705 @@
           </p:sp>
         </p:grpSp>
       </p:grpSp>
+      <p:pic>
+        <p:nvPicPr>
+          <p:cNvPr id="3" name="Graphic 2" descr="Safe with solid fill">
+            <a:extLst>
+              <a:ext uri="{FF2B5EF4-FFF2-40B4-BE49-F238E27FC236}">
+                <a16:creationId xmlns:a16="http://schemas.microsoft.com/office/drawing/2014/main" id="{2F405420-ADED-2D78-F296-8AB19C23DDEE}"/>
+              </a:ext>
+            </a:extLst>
+          </p:cNvPr>
+          <p:cNvPicPr>
+            <a:picLocks noChangeAspect="1"/>
+          </p:cNvPicPr>
+          <p:nvPr/>
+        </p:nvPicPr>
+        <p:blipFill>
+          <a:blip r:embed="rId6">
+            <a:extLst>
+              <a:ext uri="{28A0092B-C50C-407E-A947-70E740481C1C}">
+                <a14:useLocalDpi xmlns:a14="http://schemas.microsoft.com/office/drawing/2010/main" val="0"/>
+              </a:ext>
+              <a:ext uri="{96DAC541-7B7A-43D3-8B79-37D633B846F1}">
+                <asvg:svgBlip xmlns:asvg="http://schemas.microsoft.com/office/drawing/2016/SVG/main" r:embed="rId7"/>
+              </a:ext>
+            </a:extLst>
+          </a:blip>
+          <a:stretch>
+            <a:fillRect/>
+          </a:stretch>
+        </p:blipFill>
+        <p:spPr>
+          <a:xfrm>
+            <a:off x="4619686" y="3718255"/>
+            <a:ext cx="1071315" cy="1071315"/>
+          </a:xfrm>
+          <a:prstGeom prst="rect">
+            <a:avLst/>
+          </a:prstGeom>
+          <a:effectLst>
+            <a:outerShdw blurRad="50800" dist="38100" dir="2700000" algn="tl" rotWithShape="0">
+              <a:prstClr val="black">
+                <a:alpha val="40000"/>
+              </a:prstClr>
+            </a:outerShdw>
+          </a:effectLst>
+        </p:spPr>
+      </p:pic>
+      <p:sp>
+        <p:nvSpPr>
+          <p:cNvPr id="6" name="Rectangle 5">
+            <a:extLst>
+              <a:ext uri="{FF2B5EF4-FFF2-40B4-BE49-F238E27FC236}">
+                <a16:creationId xmlns:a16="http://schemas.microsoft.com/office/drawing/2014/main" id="{6C239ED8-0695-725B-2C4E-15ED599400B0}"/>
+              </a:ext>
+            </a:extLst>
+          </p:cNvPr>
+          <p:cNvSpPr/>
+          <p:nvPr/>
+        </p:nvSpPr>
+        <p:spPr>
+          <a:xfrm>
+            <a:off x="4842510" y="3907550"/>
+            <a:ext cx="624840" cy="626349"/>
+          </a:xfrm>
+          <a:prstGeom prst="rect">
+            <a:avLst/>
+          </a:prstGeom>
+          <a:solidFill>
+            <a:schemeClr val="bg1"/>
+          </a:solidFill>
+          <a:ln>
+            <a:noFill/>
+          </a:ln>
+          <a:effectLst>
+            <a:innerShdw blurRad="63500" dist="50800" dir="13500000">
+              <a:prstClr val="black">
+                <a:alpha val="50000"/>
+              </a:prstClr>
+            </a:innerShdw>
+          </a:effectLst>
+        </p:spPr>
+        <p:style>
+          <a:lnRef idx="2">
+            <a:schemeClr val="accent1">
+              <a:shade val="15000"/>
+            </a:schemeClr>
+          </a:lnRef>
+          <a:fillRef idx="1">
+            <a:schemeClr val="accent1"/>
+          </a:fillRef>
+          <a:effectRef idx="0">
+            <a:schemeClr val="accent1"/>
+          </a:effectRef>
+          <a:fontRef idx="minor">
+            <a:schemeClr val="lt1"/>
+          </a:fontRef>
+        </p:style>
+        <p:txBody>
+          <a:bodyPr rtlCol="0" anchor="ctr"/>
+          <a:lstStyle/>
+          <a:p>
+            <a:pPr algn="ctr"/>
+            <a:endParaRPr kumimoji="1" lang="ja-JP" altLang="en-US"/>
+          </a:p>
+        </p:txBody>
+      </p:sp>
+      <p:pic>
+        <p:nvPicPr>
+          <p:cNvPr id="14" name="Graphic 13" descr="Safe with solid fill">
+            <a:extLst>
+              <a:ext uri="{FF2B5EF4-FFF2-40B4-BE49-F238E27FC236}">
+                <a16:creationId xmlns:a16="http://schemas.microsoft.com/office/drawing/2014/main" id="{19FD4B73-EB1D-5C26-7A74-C9C85A288EB8}"/>
+              </a:ext>
+            </a:extLst>
+          </p:cNvPr>
+          <p:cNvPicPr>
+            <a:picLocks noChangeAspect="1"/>
+          </p:cNvPicPr>
+          <p:nvPr/>
+        </p:nvPicPr>
+        <p:blipFill rotWithShape="1">
+          <a:blip r:embed="rId6">
+            <a:extLst>
+              <a:ext uri="{28A0092B-C50C-407E-A947-70E740481C1C}">
+                <a14:useLocalDpi xmlns:a14="http://schemas.microsoft.com/office/drawing/2010/main" val="0"/>
+              </a:ext>
+              <a:ext uri="{96DAC541-7B7A-43D3-8B79-37D633B846F1}">
+                <asvg:svgBlip xmlns:asvg="http://schemas.microsoft.com/office/drawing/2016/SVG/main" r:embed="rId7"/>
+              </a:ext>
+            </a:extLst>
+          </a:blip>
+          <a:srcRect l="22636" t="19075" r="22951" b="25336"/>
+          <a:stretch/>
+        </p:blipFill>
+        <p:spPr>
+          <a:xfrm>
+            <a:off x="4504383" y="3604087"/>
+            <a:ext cx="582931" cy="595535"/>
+          </a:xfrm>
+          <a:prstGeom prst="rect">
+            <a:avLst/>
+          </a:prstGeom>
+          <a:effectLst>
+            <a:outerShdw blurRad="50800" dist="38100" dir="2700000" algn="tl" rotWithShape="0">
+              <a:prstClr val="black">
+                <a:alpha val="40000"/>
+              </a:prstClr>
+            </a:outerShdw>
+          </a:effectLst>
+        </p:spPr>
+      </p:pic>
+      <p:sp>
+        <p:nvSpPr>
+          <p:cNvPr id="50" name="Parallelogram 49">
+            <a:extLst>
+              <a:ext uri="{FF2B5EF4-FFF2-40B4-BE49-F238E27FC236}">
+                <a16:creationId xmlns:a16="http://schemas.microsoft.com/office/drawing/2014/main" id="{17C56AC4-8C96-DD21-9D0A-AE96783000DC}"/>
+              </a:ext>
+            </a:extLst>
+          </p:cNvPr>
+          <p:cNvSpPr/>
+          <p:nvPr/>
+        </p:nvSpPr>
+        <p:spPr>
+          <a:xfrm>
+            <a:off x="4594639" y="1963013"/>
+            <a:ext cx="441572" cy="78262"/>
+          </a:xfrm>
+          <a:prstGeom prst="parallelogram">
+            <a:avLst>
+              <a:gd name="adj" fmla="val 97027"/>
+            </a:avLst>
+          </a:prstGeom>
+          <a:solidFill>
+            <a:srgbClr val="F09BF0"/>
+          </a:solidFill>
+          <a:ln>
+            <a:noFill/>
+          </a:ln>
+          <a:effectLst>
+            <a:outerShdw blurRad="50800" dist="38100" dir="2700000" algn="tl" rotWithShape="0">
+              <a:prstClr val="black">
+                <a:alpha val="40000"/>
+              </a:prstClr>
+            </a:outerShdw>
+          </a:effectLst>
+        </p:spPr>
+        <p:style>
+          <a:lnRef idx="2">
+            <a:schemeClr val="accent1">
+              <a:shade val="50000"/>
+            </a:schemeClr>
+          </a:lnRef>
+          <a:fillRef idx="1">
+            <a:schemeClr val="accent1"/>
+          </a:fillRef>
+          <a:effectRef idx="0">
+            <a:schemeClr val="accent1"/>
+          </a:effectRef>
+          <a:fontRef idx="minor">
+            <a:schemeClr val="lt1"/>
+          </a:fontRef>
+        </p:style>
+        <p:txBody>
+          <a:bodyPr rtlCol="0" anchor="ctr"/>
+          <a:lstStyle/>
+          <a:p>
+            <a:pPr algn="ctr"/>
+            <a:endParaRPr kumimoji="1" lang="ja-JP" altLang="en-US"/>
+          </a:p>
+        </p:txBody>
+      </p:sp>
+      <p:sp>
+        <p:nvSpPr>
+          <p:cNvPr id="55" name="Parallelogram 54">
+            <a:extLst>
+              <a:ext uri="{FF2B5EF4-FFF2-40B4-BE49-F238E27FC236}">
+                <a16:creationId xmlns:a16="http://schemas.microsoft.com/office/drawing/2014/main" id="{7D89FD02-ED31-9D7C-C094-922F35ABF7B6}"/>
+              </a:ext>
+            </a:extLst>
+          </p:cNvPr>
+          <p:cNvSpPr/>
+          <p:nvPr/>
+        </p:nvSpPr>
+        <p:spPr>
+          <a:xfrm>
+            <a:off x="4594639" y="1715373"/>
+            <a:ext cx="441572" cy="78262"/>
+          </a:xfrm>
+          <a:prstGeom prst="parallelogram">
+            <a:avLst>
+              <a:gd name="adj" fmla="val 97027"/>
+            </a:avLst>
+          </a:prstGeom>
+          <a:solidFill>
+            <a:srgbClr val="F09BF0"/>
+          </a:solidFill>
+          <a:ln>
+            <a:noFill/>
+          </a:ln>
+          <a:effectLst>
+            <a:outerShdw blurRad="50800" dist="38100" dir="2700000" algn="tl" rotWithShape="0">
+              <a:prstClr val="black">
+                <a:alpha val="40000"/>
+              </a:prstClr>
+            </a:outerShdw>
+          </a:effectLst>
+        </p:spPr>
+        <p:style>
+          <a:lnRef idx="2">
+            <a:schemeClr val="accent1">
+              <a:shade val="50000"/>
+            </a:schemeClr>
+          </a:lnRef>
+          <a:fillRef idx="1">
+            <a:schemeClr val="accent1"/>
+          </a:fillRef>
+          <a:effectRef idx="0">
+            <a:schemeClr val="accent1"/>
+          </a:effectRef>
+          <a:fontRef idx="minor">
+            <a:schemeClr val="lt1"/>
+          </a:fontRef>
+        </p:style>
+        <p:txBody>
+          <a:bodyPr rtlCol="0" anchor="ctr"/>
+          <a:lstStyle/>
+          <a:p>
+            <a:pPr algn="ctr"/>
+            <a:endParaRPr kumimoji="1" lang="ja-JP" altLang="en-US"/>
+          </a:p>
+        </p:txBody>
+      </p:sp>
+      <p:sp>
+        <p:nvSpPr>
+          <p:cNvPr id="57" name="Parallelogram 56">
+            <a:extLst>
+              <a:ext uri="{FF2B5EF4-FFF2-40B4-BE49-F238E27FC236}">
+                <a16:creationId xmlns:a16="http://schemas.microsoft.com/office/drawing/2014/main" id="{1C86DA02-01D0-E5A8-806A-1DAA933C64CC}"/>
+              </a:ext>
+            </a:extLst>
+          </p:cNvPr>
+          <p:cNvSpPr/>
+          <p:nvPr/>
+        </p:nvSpPr>
+        <p:spPr>
+          <a:xfrm flipH="1">
+            <a:off x="4594639" y="1836630"/>
+            <a:ext cx="441572" cy="78262"/>
+          </a:xfrm>
+          <a:prstGeom prst="parallelogram">
+            <a:avLst>
+              <a:gd name="adj" fmla="val 97027"/>
+            </a:avLst>
+          </a:prstGeom>
+          <a:solidFill>
+            <a:srgbClr val="F09BF0"/>
+          </a:solidFill>
+          <a:ln>
+            <a:noFill/>
+          </a:ln>
+          <a:effectLst>
+            <a:outerShdw blurRad="50800" dist="38100" dir="2700000" algn="tl" rotWithShape="0">
+              <a:prstClr val="black">
+                <a:alpha val="40000"/>
+              </a:prstClr>
+            </a:outerShdw>
+          </a:effectLst>
+        </p:spPr>
+        <p:style>
+          <a:lnRef idx="2">
+            <a:schemeClr val="accent1">
+              <a:shade val="50000"/>
+            </a:schemeClr>
+          </a:lnRef>
+          <a:fillRef idx="1">
+            <a:schemeClr val="accent1"/>
+          </a:fillRef>
+          <a:effectRef idx="0">
+            <a:schemeClr val="accent1"/>
+          </a:effectRef>
+          <a:fontRef idx="minor">
+            <a:schemeClr val="lt1"/>
+          </a:fontRef>
+        </p:style>
+        <p:txBody>
+          <a:bodyPr rtlCol="0" anchor="ctr"/>
+          <a:lstStyle/>
+          <a:p>
+            <a:pPr algn="ctr"/>
+            <a:endParaRPr kumimoji="1" lang="ja-JP" altLang="en-US"/>
+          </a:p>
+        </p:txBody>
+      </p:sp>
+      <p:sp>
+        <p:nvSpPr>
+          <p:cNvPr id="59" name="Parallelogram 58">
+            <a:extLst>
+              <a:ext uri="{FF2B5EF4-FFF2-40B4-BE49-F238E27FC236}">
+                <a16:creationId xmlns:a16="http://schemas.microsoft.com/office/drawing/2014/main" id="{57B6E767-DB48-3DEF-0E5A-60002291675B}"/>
+              </a:ext>
+            </a:extLst>
+          </p:cNvPr>
+          <p:cNvSpPr/>
+          <p:nvPr/>
+        </p:nvSpPr>
+        <p:spPr>
+          <a:xfrm>
+            <a:off x="5054453" y="1963013"/>
+            <a:ext cx="441572" cy="78262"/>
+          </a:xfrm>
+          <a:prstGeom prst="parallelogram">
+            <a:avLst>
+              <a:gd name="adj" fmla="val 97027"/>
+            </a:avLst>
+          </a:prstGeom>
+          <a:solidFill>
+            <a:srgbClr val="F09BF0"/>
+          </a:solidFill>
+          <a:ln>
+            <a:noFill/>
+          </a:ln>
+          <a:effectLst>
+            <a:outerShdw blurRad="50800" dist="38100" dir="2700000" algn="tl" rotWithShape="0">
+              <a:prstClr val="black">
+                <a:alpha val="40000"/>
+              </a:prstClr>
+            </a:outerShdw>
+          </a:effectLst>
+        </p:spPr>
+        <p:style>
+          <a:lnRef idx="2">
+            <a:schemeClr val="accent1">
+              <a:shade val="50000"/>
+            </a:schemeClr>
+          </a:lnRef>
+          <a:fillRef idx="1">
+            <a:schemeClr val="accent1"/>
+          </a:fillRef>
+          <a:effectRef idx="0">
+            <a:schemeClr val="accent1"/>
+          </a:effectRef>
+          <a:fontRef idx="minor">
+            <a:schemeClr val="lt1"/>
+          </a:fontRef>
+        </p:style>
+        <p:txBody>
+          <a:bodyPr rtlCol="0" anchor="ctr"/>
+          <a:lstStyle/>
+          <a:p>
+            <a:pPr algn="ctr"/>
+            <a:endParaRPr kumimoji="1" lang="ja-JP" altLang="en-US"/>
+          </a:p>
+        </p:txBody>
+      </p:sp>
+      <p:sp>
+        <p:nvSpPr>
+          <p:cNvPr id="64" name="Parallelogram 63">
+            <a:extLst>
+              <a:ext uri="{FF2B5EF4-FFF2-40B4-BE49-F238E27FC236}">
+                <a16:creationId xmlns:a16="http://schemas.microsoft.com/office/drawing/2014/main" id="{C405C62D-1A6F-B8A2-D39F-2ED4E593EEA0}"/>
+              </a:ext>
+            </a:extLst>
+          </p:cNvPr>
+          <p:cNvSpPr/>
+          <p:nvPr/>
+        </p:nvSpPr>
+        <p:spPr>
+          <a:xfrm>
+            <a:off x="5054453" y="1715373"/>
+            <a:ext cx="441572" cy="78262"/>
+          </a:xfrm>
+          <a:prstGeom prst="parallelogram">
+            <a:avLst>
+              <a:gd name="adj" fmla="val 97027"/>
+            </a:avLst>
+          </a:prstGeom>
+          <a:solidFill>
+            <a:srgbClr val="F09BF0"/>
+          </a:solidFill>
+          <a:ln>
+            <a:noFill/>
+          </a:ln>
+          <a:effectLst>
+            <a:outerShdw blurRad="50800" dist="38100" dir="2700000" algn="tl" rotWithShape="0">
+              <a:prstClr val="black">
+                <a:alpha val="40000"/>
+              </a:prstClr>
+            </a:outerShdw>
+          </a:effectLst>
+        </p:spPr>
+        <p:style>
+          <a:lnRef idx="2">
+            <a:schemeClr val="accent1">
+              <a:shade val="50000"/>
+            </a:schemeClr>
+          </a:lnRef>
+          <a:fillRef idx="1">
+            <a:schemeClr val="accent1"/>
+          </a:fillRef>
+          <a:effectRef idx="0">
+            <a:schemeClr val="accent1"/>
+          </a:effectRef>
+          <a:fontRef idx="minor">
+            <a:schemeClr val="lt1"/>
+          </a:fontRef>
+        </p:style>
+        <p:txBody>
+          <a:bodyPr rtlCol="0" anchor="ctr"/>
+          <a:lstStyle/>
+          <a:p>
+            <a:pPr algn="ctr"/>
+            <a:endParaRPr kumimoji="1" lang="ja-JP" altLang="en-US"/>
+          </a:p>
+        </p:txBody>
+      </p:sp>
+      <p:sp>
+        <p:nvSpPr>
+          <p:cNvPr id="65" name="Parallelogram 64">
+            <a:extLst>
+              <a:ext uri="{FF2B5EF4-FFF2-40B4-BE49-F238E27FC236}">
+                <a16:creationId xmlns:a16="http://schemas.microsoft.com/office/drawing/2014/main" id="{2785008A-A05F-DE1E-1576-19148E6C86AF}"/>
+              </a:ext>
+            </a:extLst>
+          </p:cNvPr>
+          <p:cNvSpPr/>
+          <p:nvPr/>
+        </p:nvSpPr>
+        <p:spPr>
+          <a:xfrm flipH="1">
+            <a:off x="5054453" y="1836630"/>
+            <a:ext cx="441572" cy="78262"/>
+          </a:xfrm>
+          <a:prstGeom prst="parallelogram">
+            <a:avLst>
+              <a:gd name="adj" fmla="val 97027"/>
+            </a:avLst>
+          </a:prstGeom>
+          <a:solidFill>
+            <a:srgbClr val="F09BF0"/>
+          </a:solidFill>
+          <a:ln>
+            <a:noFill/>
+          </a:ln>
+          <a:effectLst>
+            <a:outerShdw blurRad="50800" dist="38100" dir="2700000" algn="tl" rotWithShape="0">
+              <a:prstClr val="black">
+                <a:alpha val="40000"/>
+              </a:prstClr>
+            </a:outerShdw>
+          </a:effectLst>
+        </p:spPr>
+        <p:style>
+          <a:lnRef idx="2">
+            <a:schemeClr val="accent1">
+              <a:shade val="50000"/>
+            </a:schemeClr>
+          </a:lnRef>
+          <a:fillRef idx="1">
+            <a:schemeClr val="accent1"/>
+          </a:fillRef>
+          <a:effectRef idx="0">
+            <a:schemeClr val="accent1"/>
+          </a:effectRef>
+          <a:fontRef idx="minor">
+            <a:schemeClr val="lt1"/>
+          </a:fontRef>
+        </p:style>
+        <p:txBody>
+          <a:bodyPr rtlCol="0" anchor="ctr"/>
+          <a:lstStyle/>
+          <a:p>
+            <a:pPr algn="ctr"/>
+            <a:endParaRPr kumimoji="1" lang="ja-JP" altLang="en-US"/>
+          </a:p>
+        </p:txBody>
+      </p:sp>
+      <p:sp>
+        <p:nvSpPr>
+          <p:cNvPr id="68" name="Parallelogram 67">
+            <a:extLst>
+              <a:ext uri="{FF2B5EF4-FFF2-40B4-BE49-F238E27FC236}">
+                <a16:creationId xmlns:a16="http://schemas.microsoft.com/office/drawing/2014/main" id="{9A4CF619-BB51-8219-8FA5-667A76338846}"/>
+              </a:ext>
+            </a:extLst>
+          </p:cNvPr>
+          <p:cNvSpPr/>
+          <p:nvPr/>
+        </p:nvSpPr>
+        <p:spPr>
+          <a:xfrm>
+            <a:off x="4828338" y="2331914"/>
+            <a:ext cx="441572" cy="78262"/>
+          </a:xfrm>
+          <a:prstGeom prst="parallelogram">
+            <a:avLst>
+              <a:gd name="adj" fmla="val 97027"/>
+            </a:avLst>
+          </a:prstGeom>
+          <a:solidFill>
+            <a:srgbClr val="F09BF0"/>
+          </a:solidFill>
+          <a:ln>
+            <a:noFill/>
+          </a:ln>
+          <a:effectLst>
+            <a:outerShdw blurRad="50800" dist="38100" dir="2700000" algn="tl" rotWithShape="0">
+              <a:prstClr val="black">
+                <a:alpha val="40000"/>
+              </a:prstClr>
+            </a:outerShdw>
+          </a:effectLst>
+        </p:spPr>
+        <p:style>
+          <a:lnRef idx="2">
+            <a:schemeClr val="accent1">
+              <a:shade val="50000"/>
+            </a:schemeClr>
+          </a:lnRef>
+          <a:fillRef idx="1">
+            <a:schemeClr val="accent1"/>
+          </a:fillRef>
+          <a:effectRef idx="0">
+            <a:schemeClr val="accent1"/>
+          </a:effectRef>
+          <a:fontRef idx="minor">
+            <a:schemeClr val="lt1"/>
+          </a:fontRef>
+        </p:style>
+        <p:txBody>
+          <a:bodyPr rtlCol="0" anchor="ctr"/>
+          <a:lstStyle/>
+          <a:p>
+            <a:pPr algn="ctr"/>
+            <a:endParaRPr kumimoji="1" lang="ja-JP" altLang="en-US"/>
+          </a:p>
+        </p:txBody>
+      </p:sp>
+      <p:sp>
+        <p:nvSpPr>
+          <p:cNvPr id="73" name="Parallelogram 72">
+            <a:extLst>
+              <a:ext uri="{FF2B5EF4-FFF2-40B4-BE49-F238E27FC236}">
+                <a16:creationId xmlns:a16="http://schemas.microsoft.com/office/drawing/2014/main" id="{97EDFF19-BC4F-B10E-4C8E-2250DF099C97}"/>
+              </a:ext>
+            </a:extLst>
+          </p:cNvPr>
+          <p:cNvSpPr/>
+          <p:nvPr/>
+        </p:nvSpPr>
+        <p:spPr>
+          <a:xfrm>
+            <a:off x="4828338" y="2084274"/>
+            <a:ext cx="441572" cy="78262"/>
+          </a:xfrm>
+          <a:prstGeom prst="parallelogram">
+            <a:avLst>
+              <a:gd name="adj" fmla="val 97027"/>
+            </a:avLst>
+          </a:prstGeom>
+          <a:solidFill>
+            <a:srgbClr val="F09BF0"/>
+          </a:solidFill>
+          <a:ln>
+            <a:noFill/>
+          </a:ln>
+          <a:effectLst>
+            <a:outerShdw blurRad="50800" dist="38100" dir="2700000" algn="tl" rotWithShape="0">
+              <a:prstClr val="black">
+                <a:alpha val="40000"/>
+              </a:prstClr>
+            </a:outerShdw>
+          </a:effectLst>
+        </p:spPr>
+        <p:style>
+          <a:lnRef idx="2">
+            <a:schemeClr val="accent1">
+              <a:shade val="50000"/>
+            </a:schemeClr>
+          </a:lnRef>
+          <a:fillRef idx="1">
+            <a:schemeClr val="accent1"/>
+          </a:fillRef>
+          <a:effectRef idx="0">
+            <a:schemeClr val="accent1"/>
+          </a:effectRef>
+          <a:fontRef idx="minor">
+            <a:schemeClr val="lt1"/>
+          </a:fontRef>
+        </p:style>
+        <p:txBody>
+          <a:bodyPr rtlCol="0" anchor="ctr"/>
+          <a:lstStyle/>
+          <a:p>
+            <a:pPr algn="ctr"/>
+            <a:endParaRPr kumimoji="1" lang="ja-JP" altLang="en-US"/>
+          </a:p>
+        </p:txBody>
+      </p:sp>
+      <p:sp>
+        <p:nvSpPr>
+          <p:cNvPr id="74" name="Parallelogram 73">
+            <a:extLst>
+              <a:ext uri="{FF2B5EF4-FFF2-40B4-BE49-F238E27FC236}">
+                <a16:creationId xmlns:a16="http://schemas.microsoft.com/office/drawing/2014/main" id="{6F306DF7-DBC0-7D9A-CFD5-679A7015B2D6}"/>
+              </a:ext>
+            </a:extLst>
+          </p:cNvPr>
+          <p:cNvSpPr/>
+          <p:nvPr/>
+        </p:nvSpPr>
+        <p:spPr>
+          <a:xfrm flipH="1">
+            <a:off x="4828338" y="2205531"/>
+            <a:ext cx="441572" cy="78262"/>
+          </a:xfrm>
+          <a:prstGeom prst="parallelogram">
+            <a:avLst>
+              <a:gd name="adj" fmla="val 97027"/>
+            </a:avLst>
+          </a:prstGeom>
+          <a:solidFill>
+            <a:srgbClr val="F09BF0"/>
+          </a:solidFill>
+          <a:ln>
+            <a:noFill/>
+          </a:ln>
+          <a:effectLst>
+            <a:outerShdw blurRad="50800" dist="38100" dir="2700000" algn="tl" rotWithShape="0">
+              <a:prstClr val="black">
+                <a:alpha val="40000"/>
+              </a:prstClr>
+            </a:outerShdw>
+          </a:effectLst>
+        </p:spPr>
+        <p:style>
+          <a:lnRef idx="2">
+            <a:schemeClr val="accent1">
+              <a:shade val="50000"/>
+            </a:schemeClr>
+          </a:lnRef>
+          <a:fillRef idx="1">
+            <a:schemeClr val="accent1"/>
+          </a:fillRef>
+          <a:effectRef idx="0">
+            <a:schemeClr val="accent1"/>
+          </a:effectRef>
+          <a:fontRef idx="minor">
+            <a:schemeClr val="lt1"/>
+          </a:fontRef>
+        </p:style>
+        <p:txBody>
+          <a:bodyPr rtlCol="0" anchor="ctr"/>
+          <a:lstStyle/>
+          <a:p>
+            <a:pPr algn="ctr"/>
+            <a:endParaRPr kumimoji="1" lang="ja-JP" altLang="en-US"/>
+          </a:p>
+        </p:txBody>
+      </p:sp>
     </p:spTree>
     <p:extLst>
       <p:ext uri="{BB962C8B-B14F-4D97-AF65-F5344CB8AC3E}">

</xml_diff>